<commit_message>
contrast -40% sharpen +25% removed frames standardised code style
</commit_message>
<xml_diff>
--- a/slides/add_undo.pptx
+++ b/slides/add_undo.pptx
@@ -296,7 +296,7 @@
           <a:p>
             <a:fld id="{FEB7EDEF-E75A-4013-854A-C50ED3F477DD}" type="datetimeFigureOut">
               <a:rPr lang="en-GB" smtClean="0"/>
-              <a:t>27/09/2013</a:t>
+              <a:t>28/09/2013</a:t>
             </a:fld>
             <a:endParaRPr lang="en-GB"/>
           </a:p>
@@ -466,7 +466,7 @@
           <a:p>
             <a:fld id="{FEB7EDEF-E75A-4013-854A-C50ED3F477DD}" type="datetimeFigureOut">
               <a:rPr lang="en-GB" smtClean="0"/>
-              <a:t>27/09/2013</a:t>
+              <a:t>28/09/2013</a:t>
             </a:fld>
             <a:endParaRPr lang="en-GB"/>
           </a:p>
@@ -646,7 +646,7 @@
           <a:p>
             <a:fld id="{FEB7EDEF-E75A-4013-854A-C50ED3F477DD}" type="datetimeFigureOut">
               <a:rPr lang="en-GB" smtClean="0"/>
-              <a:t>27/09/2013</a:t>
+              <a:t>28/09/2013</a:t>
             </a:fld>
             <a:endParaRPr lang="en-GB"/>
           </a:p>
@@ -816,7 +816,7 @@
           <a:p>
             <a:fld id="{FEB7EDEF-E75A-4013-854A-C50ED3F477DD}" type="datetimeFigureOut">
               <a:rPr lang="en-GB" smtClean="0"/>
-              <a:t>27/09/2013</a:t>
+              <a:t>28/09/2013</a:t>
             </a:fld>
             <a:endParaRPr lang="en-GB"/>
           </a:p>
@@ -1062,7 +1062,7 @@
           <a:p>
             <a:fld id="{FEB7EDEF-E75A-4013-854A-C50ED3F477DD}" type="datetimeFigureOut">
               <a:rPr lang="en-GB" smtClean="0"/>
-              <a:t>27/09/2013</a:t>
+              <a:t>28/09/2013</a:t>
             </a:fld>
             <a:endParaRPr lang="en-GB"/>
           </a:p>
@@ -1350,7 +1350,7 @@
           <a:p>
             <a:fld id="{FEB7EDEF-E75A-4013-854A-C50ED3F477DD}" type="datetimeFigureOut">
               <a:rPr lang="en-GB" smtClean="0"/>
-              <a:t>27/09/2013</a:t>
+              <a:t>28/09/2013</a:t>
             </a:fld>
             <a:endParaRPr lang="en-GB"/>
           </a:p>
@@ -1772,7 +1772,7 @@
           <a:p>
             <a:fld id="{FEB7EDEF-E75A-4013-854A-C50ED3F477DD}" type="datetimeFigureOut">
               <a:rPr lang="en-GB" smtClean="0"/>
-              <a:t>27/09/2013</a:t>
+              <a:t>28/09/2013</a:t>
             </a:fld>
             <a:endParaRPr lang="en-GB"/>
           </a:p>
@@ -1890,7 +1890,7 @@
           <a:p>
             <a:fld id="{FEB7EDEF-E75A-4013-854A-C50ED3F477DD}" type="datetimeFigureOut">
               <a:rPr lang="en-GB" smtClean="0"/>
-              <a:t>27/09/2013</a:t>
+              <a:t>28/09/2013</a:t>
             </a:fld>
             <a:endParaRPr lang="en-GB"/>
           </a:p>
@@ -1985,7 +1985,7 @@
           <a:p>
             <a:fld id="{FEB7EDEF-E75A-4013-854A-C50ED3F477DD}" type="datetimeFigureOut">
               <a:rPr lang="en-GB" smtClean="0"/>
-              <a:t>27/09/2013</a:t>
+              <a:t>28/09/2013</a:t>
             </a:fld>
             <a:endParaRPr lang="en-GB"/>
           </a:p>
@@ -2262,7 +2262,7 @@
           <a:p>
             <a:fld id="{FEB7EDEF-E75A-4013-854A-C50ED3F477DD}" type="datetimeFigureOut">
               <a:rPr lang="en-GB" smtClean="0"/>
-              <a:t>27/09/2013</a:t>
+              <a:t>28/09/2013</a:t>
             </a:fld>
             <a:endParaRPr lang="en-GB"/>
           </a:p>
@@ -2515,7 +2515,7 @@
           <a:p>
             <a:fld id="{FEB7EDEF-E75A-4013-854A-C50ED3F477DD}" type="datetimeFigureOut">
               <a:rPr lang="en-GB" smtClean="0"/>
-              <a:t>27/09/2013</a:t>
+              <a:t>28/09/2013</a:t>
             </a:fld>
             <a:endParaRPr lang="en-GB"/>
           </a:p>
@@ -2728,7 +2728,7 @@
           <a:p>
             <a:fld id="{FEB7EDEF-E75A-4013-854A-C50ED3F477DD}" type="datetimeFigureOut">
               <a:rPr lang="en-GB" smtClean="0"/>
-              <a:t>27/09/2013</a:t>
+              <a:t>28/09/2013</a:t>
             </a:fld>
             <a:endParaRPr lang="en-GB"/>
           </a:p>
@@ -3226,6 +3226,31 @@
           <a:lstStyle/>
           <a:p>
             <a:r>
+              <a:rPr lang="en-GB" dirty="0"/>
+              <a:t>Add file contents to the </a:t>
+            </a:r>
+            <a:r>
+              <a:rPr lang="en-GB" dirty="0" smtClean="0"/>
+              <a:t>index</a:t>
+            </a:r>
+            <a:br>
+              <a:rPr lang="en-GB" dirty="0" smtClean="0"/>
+            </a:br>
+            <a:r>
+              <a:rPr lang="en-GB" dirty="0" smtClean="0"/>
+              <a:t>(‘stage’ the change)</a:t>
+            </a:r>
+            <a:endParaRPr lang="en-GB" dirty="0" smtClean="0">
+              <a:solidFill>
+                <a:schemeClr val="accent6">
+                  <a:lumMod val="50000"/>
+                </a:schemeClr>
+              </a:solidFill>
+              <a:latin typeface="Envy Code R" panose="02000509000000020004" pitchFamily="49" charset="0"/>
+            </a:endParaRPr>
+          </a:p>
+          <a:p>
+            <a:r>
               <a:rPr lang="en-GB" dirty="0" smtClean="0">
                 <a:solidFill>
                   <a:schemeClr val="accent6">
@@ -3234,7 +3259,18 @@
                 </a:solidFill>
                 <a:latin typeface="Envy Code R" panose="02000509000000020004" pitchFamily="49" charset="0"/>
               </a:rPr>
-              <a:t>git add &lt;file&gt;</a:t>
+              <a:t>git </a:t>
+            </a:r>
+            <a:r>
+              <a:rPr lang="en-GB" dirty="0" smtClean="0">
+                <a:solidFill>
+                  <a:schemeClr val="accent6">
+                    <a:lumMod val="50000"/>
+                  </a:schemeClr>
+                </a:solidFill>
+                <a:latin typeface="Envy Code R" panose="02000509000000020004" pitchFamily="49" charset="0"/>
+              </a:rPr>
+              <a:t>add &lt;file&gt;</a:t>
             </a:r>
           </a:p>
           <a:p>
@@ -3263,17 +3299,14 @@
         </p:nvSpPr>
         <p:spPr>
           <a:xfrm>
-            <a:off x="3005826" y="3924000"/>
+            <a:off x="3005826" y="4057035"/>
             <a:ext cx="3132348" cy="2108269"/>
           </a:xfrm>
           <a:prstGeom prst="rect">
             <a:avLst/>
           </a:prstGeom>
           <a:solidFill>
-            <a:schemeClr val="tx2">
-              <a:lumMod val="20000"/>
-              <a:lumOff val="80000"/>
-            </a:schemeClr>
+            <a:schemeClr val="tx1"/>
           </a:solidFill>
         </p:spPr>
         <p:txBody>
@@ -3294,7 +3327,7 @@
               <a:rPr lang="en-GB" sz="1200" dirty="0" smtClean="0">
                 <a:solidFill>
                   <a:schemeClr val="accent6">
-                    <a:lumMod val="50000"/>
+                    <a:lumMod val="75000"/>
                   </a:schemeClr>
                 </a:solidFill>
                 <a:latin typeface="Envy Code R" panose="02000509000000020004" pitchFamily="49" charset="0"/>
@@ -3306,7 +3339,7 @@
               <a:rPr lang="en-GB" sz="1200" dirty="0" err="1" smtClean="0">
                 <a:solidFill>
                   <a:schemeClr val="accent6">
-                    <a:lumMod val="50000"/>
+                    <a:lumMod val="75000"/>
                   </a:schemeClr>
                 </a:solidFill>
                 <a:latin typeface="Envy Code R" panose="02000509000000020004" pitchFamily="49" charset="0"/>
@@ -3318,7 +3351,7 @@
               <a:rPr lang="en-GB" sz="1200" dirty="0" smtClean="0">
                 <a:solidFill>
                   <a:schemeClr val="accent6">
-                    <a:lumMod val="50000"/>
+                    <a:lumMod val="75000"/>
                   </a:schemeClr>
                 </a:solidFill>
                 <a:latin typeface="Envy Code R" panose="02000509000000020004" pitchFamily="49" charset="0"/>
@@ -3330,7 +3363,7 @@
               <a:rPr lang="en-GB" sz="1200" dirty="0" err="1" smtClean="0">
                 <a:solidFill>
                   <a:schemeClr val="accent6">
-                    <a:lumMod val="50000"/>
+                    <a:lumMod val="75000"/>
                   </a:schemeClr>
                 </a:solidFill>
                 <a:latin typeface="Envy Code R" panose="02000509000000020004" pitchFamily="49" charset="0"/>
@@ -3341,7 +3374,7 @@
             <a:endParaRPr lang="en-GB" sz="1200" dirty="0" smtClean="0">
               <a:solidFill>
                 <a:schemeClr val="accent6">
-                  <a:lumMod val="50000"/>
+                  <a:lumMod val="75000"/>
                 </a:schemeClr>
               </a:solidFill>
               <a:latin typeface="Envy Code R" panose="02000509000000020004" pitchFamily="49" charset="0"/>
@@ -3361,7 +3394,7 @@
               <a:rPr lang="en-GB" sz="1200" dirty="0">
                 <a:solidFill>
                   <a:schemeClr val="accent6">
-                    <a:lumMod val="50000"/>
+                    <a:lumMod val="75000"/>
                   </a:schemeClr>
                 </a:solidFill>
                 <a:latin typeface="Envy Code R" panose="02000509000000020004" pitchFamily="49" charset="0"/>
@@ -3373,7 +3406,7 @@
               <a:rPr lang="en-GB" sz="1200" dirty="0" smtClean="0">
                 <a:solidFill>
                   <a:schemeClr val="accent6">
-                    <a:lumMod val="50000"/>
+                    <a:lumMod val="75000"/>
                   </a:schemeClr>
                 </a:solidFill>
                 <a:latin typeface="Envy Code R" panose="02000509000000020004" pitchFamily="49" charset="0"/>
@@ -3384,7 +3417,7 @@
             <a:endParaRPr lang="en-GB" sz="1200" dirty="0">
               <a:solidFill>
                 <a:schemeClr val="accent6">
-                  <a:lumMod val="50000"/>
+                  <a:lumMod val="75000"/>
                 </a:schemeClr>
               </a:solidFill>
               <a:latin typeface="Envy Code R" panose="02000509000000020004" pitchFamily="49" charset="0"/>
@@ -3402,6 +3435,9 @@
             </a:pPr>
             <a:r>
               <a:rPr lang="en-GB" sz="1200" dirty="0">
+                <a:solidFill>
+                  <a:schemeClr val="bg1"/>
+                </a:solidFill>
                 <a:latin typeface="Envy Code R" panose="02000509000000020004" pitchFamily="49" charset="0"/>
                 <a:cs typeface="Consolas" panose="020B0609020204030204" pitchFamily="49" charset="0"/>
               </a:rPr>
@@ -3419,6 +3455,9 @@
             </a:pPr>
             <a:r>
               <a:rPr lang="en-GB" sz="1200" dirty="0">
+                <a:solidFill>
+                  <a:schemeClr val="bg1"/>
+                </a:solidFill>
                 <a:latin typeface="Envy Code R" panose="02000509000000020004" pitchFamily="49" charset="0"/>
                 <a:cs typeface="Consolas" panose="020B0609020204030204" pitchFamily="49" charset="0"/>
               </a:rPr>
@@ -3436,6 +3475,9 @@
             </a:pPr>
             <a:r>
               <a:rPr lang="en-GB" sz="1200" dirty="0">
+                <a:solidFill>
+                  <a:schemeClr val="bg1"/>
+                </a:solidFill>
                 <a:latin typeface="Envy Code R" panose="02000509000000020004" pitchFamily="49" charset="0"/>
                 <a:cs typeface="Consolas" panose="020B0609020204030204" pitchFamily="49" charset="0"/>
               </a:rPr>
@@ -3443,12 +3485,18 @@
             </a:r>
             <a:r>
               <a:rPr lang="en-GB" sz="1200" dirty="0" err="1">
+                <a:solidFill>
+                  <a:schemeClr val="bg1"/>
+                </a:solidFill>
                 <a:latin typeface="Envy Code R" panose="02000509000000020004" pitchFamily="49" charset="0"/>
                 <a:cs typeface="Consolas" panose="020B0609020204030204" pitchFamily="49" charset="0"/>
               </a:rPr>
               <a:t>modifiedfile</a:t>
             </a:r>
             <a:endParaRPr lang="en-GB" sz="1200" dirty="0">
+              <a:solidFill>
+                <a:schemeClr val="bg1"/>
+              </a:solidFill>
               <a:latin typeface="Envy Code R" panose="02000509000000020004" pitchFamily="49" charset="0"/>
               <a:cs typeface="Consolas" panose="020B0609020204030204" pitchFamily="49" charset="0"/>
             </a:endParaRPr>
@@ -3464,6 +3512,9 @@
             </a:pPr>
             <a:r>
               <a:rPr lang="en-GB" sz="1200" dirty="0">
+                <a:solidFill>
+                  <a:schemeClr val="bg1"/>
+                </a:solidFill>
                 <a:latin typeface="Envy Code R" panose="02000509000000020004" pitchFamily="49" charset="0"/>
                 <a:cs typeface="Consolas" panose="020B0609020204030204" pitchFamily="49" charset="0"/>
               </a:rPr>
@@ -3471,12 +3522,18 @@
             </a:r>
             <a:r>
               <a:rPr lang="en-GB" sz="1200" dirty="0" err="1" smtClean="0">
+                <a:solidFill>
+                  <a:schemeClr val="bg1"/>
+                </a:solidFill>
                 <a:latin typeface="Envy Code R" panose="02000509000000020004" pitchFamily="49" charset="0"/>
                 <a:cs typeface="Consolas" panose="020B0609020204030204" pitchFamily="49" charset="0"/>
               </a:rPr>
               <a:t>deletedfile</a:t>
             </a:r>
             <a:endParaRPr lang="en-GB" sz="1200" dirty="0">
+              <a:solidFill>
+                <a:schemeClr val="bg1"/>
+              </a:solidFill>
               <a:latin typeface="Envy Code R" panose="02000509000000020004" pitchFamily="49" charset="0"/>
               <a:cs typeface="Consolas" panose="020B0609020204030204" pitchFamily="49" charset="0"/>
             </a:endParaRPr>
@@ -3492,6 +3549,9 @@
             </a:pPr>
             <a:r>
               <a:rPr lang="en-GB" sz="1200" dirty="0">
+                <a:solidFill>
+                  <a:schemeClr val="bg1"/>
+                </a:solidFill>
                 <a:latin typeface="Envy Code R" panose="02000509000000020004" pitchFamily="49" charset="0"/>
                 <a:cs typeface="Consolas" panose="020B0609020204030204" pitchFamily="49" charset="0"/>
               </a:rPr>
@@ -3509,6 +3569,9 @@
             </a:pPr>
             <a:r>
               <a:rPr lang="en-GB" sz="1200" dirty="0">
+                <a:solidFill>
+                  <a:schemeClr val="bg1"/>
+                </a:solidFill>
                 <a:latin typeface="Envy Code R" panose="02000509000000020004" pitchFamily="49" charset="0"/>
                 <a:cs typeface="Consolas" panose="020B0609020204030204" pitchFamily="49" charset="0"/>
               </a:rPr>
@@ -3516,12 +3579,18 @@
             </a:r>
             <a:r>
               <a:rPr lang="en-GB" sz="1200" dirty="0" err="1">
+                <a:solidFill>
+                  <a:schemeClr val="bg1"/>
+                </a:solidFill>
                 <a:latin typeface="Envy Code R" panose="02000509000000020004" pitchFamily="49" charset="0"/>
                 <a:cs typeface="Consolas" panose="020B0609020204030204" pitchFamily="49" charset="0"/>
               </a:rPr>
               <a:t>newfile</a:t>
             </a:r>
             <a:endParaRPr lang="en-GB" sz="1200" dirty="0">
+              <a:solidFill>
+                <a:schemeClr val="bg1"/>
+              </a:solidFill>
               <a:latin typeface="Envy Code R" panose="02000509000000020004" pitchFamily="49" charset="0"/>
               <a:cs typeface="Consolas" panose="020B0609020204030204" pitchFamily="49" charset="0"/>
             </a:endParaRPr>
@@ -3536,7 +3605,7 @@
         </p:nvSpPr>
         <p:spPr>
           <a:xfrm>
-            <a:off x="6300192" y="4936522"/>
+            <a:off x="6300192" y="5069557"/>
             <a:ext cx="1980220" cy="369332"/>
           </a:xfrm>
           <a:prstGeom prst="rect">
@@ -3556,14 +3625,18 @@
             <a:r>
               <a:rPr lang="en-GB" dirty="0" smtClean="0">
                 <a:solidFill>
-                  <a:schemeClr val="bg1"/>
+                  <a:schemeClr val="accent6">
+                    <a:lumMod val="75000"/>
+                  </a:schemeClr>
                 </a:solidFill>
               </a:rPr>
               <a:t>The ‘Staging Area’</a:t>
             </a:r>
             <a:endParaRPr lang="en-GB" dirty="0">
               <a:solidFill>
-                <a:schemeClr val="bg1"/>
+                <a:schemeClr val="accent6">
+                  <a:lumMod val="75000"/>
+                </a:schemeClr>
               </a:solidFill>
             </a:endParaRPr>
           </a:p>
@@ -3577,7 +3650,7 @@
         </p:nvSpPr>
         <p:spPr>
           <a:xfrm>
-            <a:off x="3059832" y="4725144"/>
+            <a:off x="3059832" y="4858179"/>
             <a:ext cx="2880320" cy="792089"/>
           </a:xfrm>
           <a:prstGeom prst="rect">
@@ -3586,7 +3659,9 @@
           <a:noFill/>
           <a:ln>
             <a:solidFill>
-              <a:schemeClr val="tx1"/>
+              <a:schemeClr val="accent6">
+                <a:lumMod val="75000"/>
+              </a:schemeClr>
             </a:solidFill>
           </a:ln>
         </p:spPr>
@@ -3626,7 +3701,7 @@
         </p:nvCxnSpPr>
         <p:spPr>
           <a:xfrm flipH="1">
-            <a:off x="5940152" y="5121188"/>
+            <a:off x="5940152" y="5254223"/>
             <a:ext cx="360040" cy="1"/>
           </a:xfrm>
           <a:prstGeom prst="straightConnector1">
@@ -3634,7 +3709,9 @@
           </a:prstGeom>
           <a:ln w="38100">
             <a:solidFill>
-              <a:schemeClr val="tx1"/>
+              <a:schemeClr val="accent6">
+                <a:lumMod val="75000"/>
+              </a:schemeClr>
             </a:solidFill>
             <a:headEnd type="none" w="med" len="med"/>
             <a:tailEnd type="triangle" w="med" len="med"/>
@@ -3671,6 +3748,11 @@
 <file path=ppt/slides/slide3.xml><?xml version="1.0" encoding="utf-8"?>
 <p:sld xmlns:a="http://schemas.openxmlformats.org/drawingml/2006/main" xmlns:r="http://schemas.openxmlformats.org/officeDocument/2006/relationships" xmlns:p="http://schemas.openxmlformats.org/presentationml/2006/main">
   <p:cSld>
+    <p:bg>
+      <p:bgRef idx="1001">
+        <a:schemeClr val="bg1"/>
+      </p:bgRef>
+    </p:bg>
     <p:spTree>
       <p:nvGrpSpPr>
         <p:cNvPr id="1" name=""/>
@@ -3861,16 +3943,13 @@
         <p:spPr>
           <a:xfrm>
             <a:off x="4788024" y="1495892"/>
-            <a:ext cx="3672408" cy="1569660"/>
+            <a:ext cx="3672408" cy="1608133"/>
           </a:xfrm>
           <a:prstGeom prst="rect">
             <a:avLst/>
           </a:prstGeom>
           <a:solidFill>
-            <a:schemeClr val="tx2">
-              <a:lumMod val="20000"/>
-              <a:lumOff val="80000"/>
-            </a:schemeClr>
+            <a:schemeClr val="tx1"/>
           </a:solidFill>
         </p:spPr>
         <p:txBody>
@@ -3883,7 +3962,7 @@
               <a:rPr lang="en-GB" sz="1200" dirty="0">
                 <a:solidFill>
                   <a:schemeClr val="accent6">
-                    <a:lumMod val="50000"/>
+                    <a:lumMod val="75000"/>
                   </a:schemeClr>
                 </a:solidFill>
                 <a:latin typeface="Envy Code R" panose="02000509000000020004" pitchFamily="49" charset="0"/>
@@ -3897,7 +3976,7 @@
               <a:rPr lang="en-GB" sz="1200" dirty="0">
                 <a:solidFill>
                   <a:schemeClr val="accent6">
-                    <a:lumMod val="50000"/>
+                    <a:lumMod val="75000"/>
                   </a:schemeClr>
                 </a:solidFill>
                 <a:latin typeface="Envy Code R" panose="02000509000000020004" pitchFamily="49" charset="0"/>
@@ -3909,6 +3988,9 @@
           <a:p>
             <a:r>
               <a:rPr lang="en-GB" sz="1200" dirty="0">
+                <a:solidFill>
+                  <a:schemeClr val="bg1"/>
+                </a:solidFill>
                 <a:latin typeface="Envy Code R" panose="02000509000000020004" pitchFamily="49" charset="0"/>
                 <a:cs typeface="Consolas" panose="020B0609020204030204" pitchFamily="49" charset="0"/>
               </a:rPr>
@@ -3918,6 +4000,9 @@
           <a:p>
             <a:r>
               <a:rPr lang="en-GB" sz="1200" dirty="0">
+                <a:solidFill>
+                  <a:schemeClr val="bg1"/>
+                </a:solidFill>
                 <a:latin typeface="Envy Code R" panose="02000509000000020004" pitchFamily="49" charset="0"/>
                 <a:cs typeface="Consolas" panose="020B0609020204030204" pitchFamily="49" charset="0"/>
               </a:rPr>
@@ -3927,6 +4012,9 @@
           <a:p>
             <a:r>
               <a:rPr lang="en-GB" sz="1200" dirty="0">
+                <a:solidFill>
+                  <a:schemeClr val="bg1"/>
+                </a:solidFill>
                 <a:latin typeface="Envy Code R" panose="02000509000000020004" pitchFamily="49" charset="0"/>
                 <a:cs typeface="Consolas" panose="020B0609020204030204" pitchFamily="49" charset="0"/>
               </a:rPr>
@@ -3934,12 +4022,18 @@
             </a:r>
             <a:r>
               <a:rPr lang="en-GB" sz="1200" dirty="0" err="1">
+                <a:solidFill>
+                  <a:schemeClr val="bg1"/>
+                </a:solidFill>
                 <a:latin typeface="Envy Code R" panose="02000509000000020004" pitchFamily="49" charset="0"/>
                 <a:cs typeface="Consolas" panose="020B0609020204030204" pitchFamily="49" charset="0"/>
               </a:rPr>
               <a:t>modifiedfile</a:t>
             </a:r>
             <a:endParaRPr lang="en-GB" sz="1200" dirty="0">
+              <a:solidFill>
+                <a:schemeClr val="bg1"/>
+              </a:solidFill>
               <a:latin typeface="Envy Code R" panose="02000509000000020004" pitchFamily="49" charset="0"/>
               <a:cs typeface="Consolas" panose="020B0609020204030204" pitchFamily="49" charset="0"/>
             </a:endParaRPr>
@@ -3947,6 +4041,9 @@
           <a:p>
             <a:r>
               <a:rPr lang="en-GB" sz="1200" dirty="0">
+                <a:solidFill>
+                  <a:schemeClr val="bg1"/>
+                </a:solidFill>
                 <a:latin typeface="Envy Code R" panose="02000509000000020004" pitchFamily="49" charset="0"/>
                 <a:cs typeface="Consolas" panose="020B0609020204030204" pitchFamily="49" charset="0"/>
               </a:rPr>
@@ -3954,12 +4051,18 @@
             </a:r>
             <a:r>
               <a:rPr lang="en-GB" sz="1200" dirty="0" err="1">
+                <a:solidFill>
+                  <a:schemeClr val="bg1"/>
+                </a:solidFill>
                 <a:latin typeface="Envy Code R" panose="02000509000000020004" pitchFamily="49" charset="0"/>
                 <a:cs typeface="Consolas" panose="020B0609020204030204" pitchFamily="49" charset="0"/>
               </a:rPr>
               <a:t>newfile</a:t>
             </a:r>
             <a:endParaRPr lang="en-GB" sz="1200" dirty="0">
+              <a:solidFill>
+                <a:schemeClr val="bg1"/>
+              </a:solidFill>
               <a:latin typeface="Envy Code R" panose="02000509000000020004" pitchFamily="49" charset="0"/>
               <a:cs typeface="Consolas" panose="020B0609020204030204" pitchFamily="49" charset="0"/>
             </a:endParaRPr>
@@ -3967,6 +4070,9 @@
           <a:p>
             <a:r>
               <a:rPr lang="en-GB" sz="1200" dirty="0">
+                <a:solidFill>
+                  <a:schemeClr val="bg1"/>
+                </a:solidFill>
                 <a:latin typeface="Envy Code R" panose="02000509000000020004" pitchFamily="49" charset="0"/>
                 <a:cs typeface="Consolas" panose="020B0609020204030204" pitchFamily="49" charset="0"/>
               </a:rPr>
@@ -3976,19 +4082,28 @@
           <a:p>
             <a:r>
               <a:rPr lang="en-GB" sz="1200" dirty="0">
+                <a:solidFill>
+                  <a:schemeClr val="bg1"/>
+                </a:solidFill>
                 <a:latin typeface="Envy Code R" panose="02000509000000020004" pitchFamily="49" charset="0"/>
                 <a:cs typeface="Consolas" panose="020B0609020204030204" pitchFamily="49" charset="0"/>
               </a:rPr>
               <a:t>#       deleted:    </a:t>
             </a:r>
             <a:r>
-              <a:rPr lang="en-GB" sz="1200" dirty="0" err="1" smtClean="0">
+              <a:rPr lang="en-GB" sz="1200" dirty="0" err="1">
+                <a:solidFill>
+                  <a:schemeClr val="bg1"/>
+                </a:solidFill>
                 <a:latin typeface="Envy Code R" panose="02000509000000020004" pitchFamily="49" charset="0"/>
                 <a:cs typeface="Consolas" panose="020B0609020204030204" pitchFamily="49" charset="0"/>
               </a:rPr>
               <a:t>deletedfile</a:t>
             </a:r>
             <a:endParaRPr lang="en-GB" sz="1200" dirty="0">
+              <a:solidFill>
+                <a:schemeClr val="bg1"/>
+              </a:solidFill>
               <a:latin typeface="Envy Code R" panose="02000509000000020004" pitchFamily="49" charset="0"/>
               <a:cs typeface="Consolas" panose="020B0609020204030204" pitchFamily="49" charset="0"/>
             </a:endParaRPr>
@@ -4010,10 +4125,7 @@
             <a:avLst/>
           </a:prstGeom>
           <a:solidFill>
-            <a:schemeClr val="tx2">
-              <a:lumMod val="20000"/>
-              <a:lumOff val="80000"/>
-            </a:schemeClr>
+            <a:schemeClr val="tx1"/>
           </a:solidFill>
         </p:spPr>
         <p:txBody>
@@ -4026,7 +4138,7 @@
               <a:rPr lang="en-GB" sz="1200" dirty="0">
                 <a:solidFill>
                   <a:schemeClr val="accent6">
-                    <a:lumMod val="50000"/>
+                    <a:lumMod val="75000"/>
                   </a:schemeClr>
                 </a:solidFill>
                 <a:latin typeface="Envy Code R" panose="02000509000000020004" pitchFamily="49" charset="0"/>
@@ -4040,7 +4152,7 @@
               <a:rPr lang="en-GB" sz="1200" dirty="0">
                 <a:solidFill>
                   <a:schemeClr val="accent6">
-                    <a:lumMod val="50000"/>
+                    <a:lumMod val="75000"/>
                   </a:schemeClr>
                 </a:solidFill>
                 <a:latin typeface="Envy Code R" panose="02000509000000020004" pitchFamily="49" charset="0"/>
@@ -4052,6 +4164,9 @@
           <a:p>
             <a:r>
               <a:rPr lang="en-GB" sz="1200" dirty="0">
+                <a:solidFill>
+                  <a:schemeClr val="bg1"/>
+                </a:solidFill>
                 <a:latin typeface="Envy Code R" panose="02000509000000020004" pitchFamily="49" charset="0"/>
                 <a:cs typeface="Consolas" panose="020B0609020204030204" pitchFamily="49" charset="0"/>
               </a:rPr>
@@ -4061,6 +4176,9 @@
           <a:p>
             <a:r>
               <a:rPr lang="en-GB" sz="1200" dirty="0">
+                <a:solidFill>
+                  <a:schemeClr val="bg1"/>
+                </a:solidFill>
                 <a:latin typeface="Envy Code R" panose="02000509000000020004" pitchFamily="49" charset="0"/>
                 <a:cs typeface="Consolas" panose="020B0609020204030204" pitchFamily="49" charset="0"/>
               </a:rPr>
@@ -4070,6 +4188,9 @@
           <a:p>
             <a:r>
               <a:rPr lang="en-GB" sz="1200" dirty="0">
+                <a:solidFill>
+                  <a:schemeClr val="bg1"/>
+                </a:solidFill>
                 <a:latin typeface="Envy Code R" panose="02000509000000020004" pitchFamily="49" charset="0"/>
                 <a:cs typeface="Consolas" panose="020B0609020204030204" pitchFamily="49" charset="0"/>
               </a:rPr>
@@ -4077,12 +4198,18 @@
             </a:r>
             <a:r>
               <a:rPr lang="en-GB" sz="1200" dirty="0" err="1">
+                <a:solidFill>
+                  <a:schemeClr val="bg1"/>
+                </a:solidFill>
                 <a:latin typeface="Envy Code R" panose="02000509000000020004" pitchFamily="49" charset="0"/>
                 <a:cs typeface="Consolas" panose="020B0609020204030204" pitchFamily="49" charset="0"/>
               </a:rPr>
               <a:t>modifiedfile</a:t>
             </a:r>
             <a:endParaRPr lang="en-GB" sz="1200" dirty="0">
+              <a:solidFill>
+                <a:schemeClr val="bg1"/>
+              </a:solidFill>
               <a:latin typeface="Envy Code R" panose="02000509000000020004" pitchFamily="49" charset="0"/>
               <a:cs typeface="Consolas" panose="020B0609020204030204" pitchFamily="49" charset="0"/>
             </a:endParaRPr>
@@ -4090,6 +4217,9 @@
           <a:p>
             <a:r>
               <a:rPr lang="en-GB" sz="1200" dirty="0">
+                <a:solidFill>
+                  <a:schemeClr val="bg1"/>
+                </a:solidFill>
                 <a:latin typeface="Envy Code R" panose="02000509000000020004" pitchFamily="49" charset="0"/>
                 <a:cs typeface="Consolas" panose="020B0609020204030204" pitchFamily="49" charset="0"/>
               </a:rPr>
@@ -4097,12 +4227,18 @@
             </a:r>
             <a:r>
               <a:rPr lang="en-GB" sz="1200" dirty="0" err="1">
+                <a:solidFill>
+                  <a:schemeClr val="bg1"/>
+                </a:solidFill>
                 <a:latin typeface="Envy Code R" panose="02000509000000020004" pitchFamily="49" charset="0"/>
                 <a:cs typeface="Consolas" panose="020B0609020204030204" pitchFamily="49" charset="0"/>
               </a:rPr>
               <a:t>deletedfile</a:t>
             </a:r>
             <a:endParaRPr lang="en-GB" sz="1200" dirty="0">
+              <a:solidFill>
+                <a:schemeClr val="bg1"/>
+              </a:solidFill>
               <a:latin typeface="Envy Code R" panose="02000509000000020004" pitchFamily="49" charset="0"/>
               <a:cs typeface="Consolas" panose="020B0609020204030204" pitchFamily="49" charset="0"/>
             </a:endParaRPr>
@@ -4110,6 +4246,9 @@
           <a:p>
             <a:r>
               <a:rPr lang="en-GB" sz="1200" dirty="0">
+                <a:solidFill>
+                  <a:schemeClr val="bg1"/>
+                </a:solidFill>
                 <a:latin typeface="Envy Code R" panose="02000509000000020004" pitchFamily="49" charset="0"/>
                 <a:cs typeface="Consolas" panose="020B0609020204030204" pitchFamily="49" charset="0"/>
               </a:rPr>
@@ -4119,6 +4258,9 @@
           <a:p>
             <a:r>
               <a:rPr lang="en-GB" sz="1200" dirty="0">
+                <a:solidFill>
+                  <a:schemeClr val="bg1"/>
+                </a:solidFill>
                 <a:latin typeface="Envy Code R" panose="02000509000000020004" pitchFamily="49" charset="0"/>
                 <a:cs typeface="Consolas" panose="020B0609020204030204" pitchFamily="49" charset="0"/>
               </a:rPr>
@@ -4126,12 +4268,18 @@
             </a:r>
             <a:r>
               <a:rPr lang="en-GB" sz="1200" dirty="0" err="1">
+                <a:solidFill>
+                  <a:schemeClr val="bg1"/>
+                </a:solidFill>
                 <a:latin typeface="Envy Code R" panose="02000509000000020004" pitchFamily="49" charset="0"/>
                 <a:cs typeface="Consolas" panose="020B0609020204030204" pitchFamily="49" charset="0"/>
               </a:rPr>
               <a:t>newfile</a:t>
             </a:r>
             <a:endParaRPr lang="en-GB" sz="1200" dirty="0">
+              <a:solidFill>
+                <a:schemeClr val="bg1"/>
+              </a:solidFill>
               <a:latin typeface="Envy Code R" panose="02000509000000020004" pitchFamily="49" charset="0"/>
               <a:cs typeface="Consolas" panose="020B0609020204030204" pitchFamily="49" charset="0"/>
             </a:endParaRPr>
@@ -4147,16 +4295,13 @@
         <p:spPr>
           <a:xfrm>
             <a:off x="4796325" y="4854644"/>
-            <a:ext cx="3664107" cy="1384995"/>
+            <a:ext cx="3664107" cy="1423467"/>
           </a:xfrm>
           <a:prstGeom prst="rect">
             <a:avLst/>
           </a:prstGeom>
           <a:solidFill>
-            <a:schemeClr val="tx2">
-              <a:lumMod val="20000"/>
-              <a:lumOff val="80000"/>
-            </a:schemeClr>
+            <a:schemeClr val="tx1"/>
           </a:solidFill>
         </p:spPr>
         <p:txBody>
@@ -4169,7 +4314,7 @@
               <a:rPr lang="en-GB" sz="1200" dirty="0">
                 <a:solidFill>
                   <a:schemeClr val="accent6">
-                    <a:lumMod val="50000"/>
+                    <a:lumMod val="75000"/>
                   </a:schemeClr>
                 </a:solidFill>
                 <a:latin typeface="Envy Code R" panose="02000509000000020004" pitchFamily="49" charset="0"/>
@@ -4183,7 +4328,7 @@
               <a:rPr lang="en-GB" sz="1200" dirty="0">
                 <a:solidFill>
                   <a:schemeClr val="accent6">
-                    <a:lumMod val="50000"/>
+                    <a:lumMod val="75000"/>
                   </a:schemeClr>
                 </a:solidFill>
                 <a:latin typeface="Envy Code R" panose="02000509000000020004" pitchFamily="49" charset="0"/>
@@ -4195,6 +4340,9 @@
           <a:p>
             <a:r>
               <a:rPr lang="en-GB" sz="1200" dirty="0">
+                <a:solidFill>
+                  <a:schemeClr val="bg1"/>
+                </a:solidFill>
                 <a:latin typeface="Envy Code R" panose="02000509000000020004" pitchFamily="49" charset="0"/>
                 <a:cs typeface="Consolas" panose="020B0609020204030204" pitchFamily="49" charset="0"/>
               </a:rPr>
@@ -4204,6 +4352,9 @@
           <a:p>
             <a:r>
               <a:rPr lang="en-GB" sz="1200" dirty="0">
+                <a:solidFill>
+                  <a:schemeClr val="bg1"/>
+                </a:solidFill>
                 <a:latin typeface="Envy Code R" panose="02000509000000020004" pitchFamily="49" charset="0"/>
                 <a:cs typeface="Consolas" panose="020B0609020204030204" pitchFamily="49" charset="0"/>
               </a:rPr>
@@ -4213,6 +4364,9 @@
           <a:p>
             <a:r>
               <a:rPr lang="en-GB" sz="1200" dirty="0">
+                <a:solidFill>
+                  <a:schemeClr val="bg1"/>
+                </a:solidFill>
                 <a:latin typeface="Envy Code R" panose="02000509000000020004" pitchFamily="49" charset="0"/>
                 <a:cs typeface="Consolas" panose="020B0609020204030204" pitchFamily="49" charset="0"/>
               </a:rPr>
@@ -4220,12 +4374,18 @@
             </a:r>
             <a:r>
               <a:rPr lang="en-GB" sz="1200" dirty="0" err="1">
+                <a:solidFill>
+                  <a:schemeClr val="bg1"/>
+                </a:solidFill>
                 <a:latin typeface="Envy Code R" panose="02000509000000020004" pitchFamily="49" charset="0"/>
                 <a:cs typeface="Consolas" panose="020B0609020204030204" pitchFamily="49" charset="0"/>
               </a:rPr>
               <a:t>modifiedfile</a:t>
             </a:r>
             <a:endParaRPr lang="en-GB" sz="1200" dirty="0">
+              <a:solidFill>
+                <a:schemeClr val="bg1"/>
+              </a:solidFill>
               <a:latin typeface="Envy Code R" panose="02000509000000020004" pitchFamily="49" charset="0"/>
               <a:cs typeface="Consolas" panose="020B0609020204030204" pitchFamily="49" charset="0"/>
             </a:endParaRPr>
@@ -4233,6 +4393,9 @@
           <a:p>
             <a:r>
               <a:rPr lang="en-GB" sz="1200" dirty="0">
+                <a:solidFill>
+                  <a:schemeClr val="bg1"/>
+                </a:solidFill>
                 <a:latin typeface="Envy Code R" panose="02000509000000020004" pitchFamily="49" charset="0"/>
                 <a:cs typeface="Consolas" panose="020B0609020204030204" pitchFamily="49" charset="0"/>
               </a:rPr>
@@ -4240,12 +4403,18 @@
             </a:r>
             <a:r>
               <a:rPr lang="en-GB" sz="1200" dirty="0" err="1">
+                <a:solidFill>
+                  <a:schemeClr val="bg1"/>
+                </a:solidFill>
                 <a:latin typeface="Envy Code R" panose="02000509000000020004" pitchFamily="49" charset="0"/>
                 <a:cs typeface="Consolas" panose="020B0609020204030204" pitchFamily="49" charset="0"/>
               </a:rPr>
               <a:t>deletedfile</a:t>
             </a:r>
             <a:endParaRPr lang="en-GB" sz="1200" dirty="0">
+              <a:solidFill>
+                <a:schemeClr val="bg1"/>
+              </a:solidFill>
               <a:latin typeface="Envy Code R" panose="02000509000000020004" pitchFamily="49" charset="0"/>
               <a:cs typeface="Consolas" panose="020B0609020204030204" pitchFamily="49" charset="0"/>
             </a:endParaRPr>
@@ -4253,6 +4422,9 @@
           <a:p>
             <a:r>
               <a:rPr lang="en-GB" sz="1200" dirty="0">
+                <a:solidFill>
+                  <a:schemeClr val="bg1"/>
+                </a:solidFill>
                 <a:latin typeface="Envy Code R" panose="02000509000000020004" pitchFamily="49" charset="0"/>
                 <a:cs typeface="Consolas" panose="020B0609020204030204" pitchFamily="49" charset="0"/>
               </a:rPr>
@@ -4260,12 +4432,18 @@
             </a:r>
             <a:r>
               <a:rPr lang="en-GB" sz="1200" dirty="0" err="1">
+                <a:solidFill>
+                  <a:schemeClr val="bg1"/>
+                </a:solidFill>
                 <a:latin typeface="Envy Code R" panose="02000509000000020004" pitchFamily="49" charset="0"/>
                 <a:cs typeface="Consolas" panose="020B0609020204030204" pitchFamily="49" charset="0"/>
               </a:rPr>
               <a:t>newfile</a:t>
             </a:r>
             <a:endParaRPr lang="en-GB" sz="1200" dirty="0">
+              <a:solidFill>
+                <a:schemeClr val="bg1"/>
+              </a:solidFill>
               <a:latin typeface="Envy Code R" panose="02000509000000020004" pitchFamily="49" charset="0"/>
               <a:cs typeface="Consolas" panose="020B0609020204030204" pitchFamily="49" charset="0"/>
             </a:endParaRPr>
@@ -4280,7 +4458,7 @@
     </p:extLst>
   </p:cSld>
   <p:clrMapOvr>
-    <a:masterClrMapping/>
+    <a:overrideClrMapping bg1="lt1" tx1="dk1" bg2="lt2" tx2="dk2" accent1="accent1" accent2="accent2" accent3="accent3" accent4="accent4" accent5="accent5" accent6="accent6" hlink="hlink" folHlink="folHlink"/>
   </p:clrMapOvr>
 </p:sld>
 </file>
@@ -5169,6 +5347,11 @@
 <file path=ppt/slides/slide7.xml><?xml version="1.0" encoding="utf-8"?>
 <p:sld xmlns:a="http://schemas.openxmlformats.org/drawingml/2006/main" xmlns:r="http://schemas.openxmlformats.org/officeDocument/2006/relationships" xmlns:p="http://schemas.openxmlformats.org/presentationml/2006/main">
   <p:cSld>
+    <p:bg>
+      <p:bgRef idx="1001">
+        <a:schemeClr val="bg1"/>
+      </p:bgRef>
+    </p:bg>
     <p:spTree>
       <p:nvGrpSpPr>
         <p:cNvPr id="1" name=""/>
@@ -5265,6 +5448,9 @@
             <a:endParaRPr lang="en-GB" sz="2800" dirty="0" smtClean="0"/>
           </a:p>
           <a:p>
+            <a:pPr marL="0" indent="0">
+              <a:buNone/>
+            </a:pPr>
             <a:r>
               <a:rPr lang="en-GB" sz="2800" dirty="0" smtClean="0"/>
               <a:t/>
@@ -5397,17 +5583,14 @@
         </p:nvSpPr>
         <p:spPr>
           <a:xfrm>
-            <a:off x="2267744" y="2760891"/>
-            <a:ext cx="4608512" cy="2108269"/>
+            <a:off x="1763688" y="2837254"/>
+            <a:ext cx="5616624" cy="1815882"/>
           </a:xfrm>
           <a:prstGeom prst="rect">
             <a:avLst/>
           </a:prstGeom>
           <a:solidFill>
-            <a:schemeClr val="tx2">
-              <a:lumMod val="20000"/>
-              <a:lumOff val="80000"/>
-            </a:schemeClr>
+            <a:schemeClr val="tx1"/>
           </a:solidFill>
         </p:spPr>
         <p:txBody>
@@ -5416,16 +5599,11 @@
           </a:bodyPr>
           <a:lstStyle/>
           <a:p>
-            <a:pPr>
-              <a:spcBef>
-                <a:spcPts val="300"/>
-              </a:spcBef>
-              <a:spcAft>
-                <a:spcPts val="300"/>
-              </a:spcAft>
-            </a:pPr>
-            <a:r>
-              <a:rPr lang="en-GB" sz="1200" dirty="0" smtClean="0">
+            <a:r>
+              <a:rPr lang="en-GB" sz="1400" dirty="0">
+                <a:solidFill>
+                  <a:schemeClr val="bg1"/>
+                </a:solidFill>
                 <a:latin typeface="Envy Code R" panose="02000509000000020004" pitchFamily="49" charset="0"/>
                 <a:cs typeface="Consolas" panose="020B0609020204030204" pitchFamily="49" charset="0"/>
               </a:rPr>
@@ -5433,19 +5611,11 @@
             </a:r>
           </a:p>
           <a:p>
-            <a:pPr>
-              <a:spcBef>
-                <a:spcPts val="300"/>
-              </a:spcBef>
-              <a:spcAft>
-                <a:spcPts val="300"/>
-              </a:spcAft>
-            </a:pPr>
-            <a:r>
-              <a:rPr lang="en-GB" sz="1200" dirty="0" smtClean="0">
-                <a:solidFill>
-                  <a:schemeClr val="accent6">
-                    <a:lumMod val="50000"/>
+            <a:r>
+              <a:rPr lang="en-GB" sz="1400" dirty="0">
+                <a:solidFill>
+                  <a:schemeClr val="accent6">
+                    <a:lumMod val="75000"/>
                   </a:schemeClr>
                 </a:solidFill>
                 <a:latin typeface="Envy Code R" panose="02000509000000020004" pitchFamily="49" charset="0"/>
@@ -5455,19 +5625,11 @@
             </a:r>
           </a:p>
           <a:p>
-            <a:pPr>
-              <a:spcBef>
-                <a:spcPts val="300"/>
-              </a:spcBef>
-              <a:spcAft>
-                <a:spcPts val="300"/>
-              </a:spcAft>
-            </a:pPr>
-            <a:r>
-              <a:rPr lang="en-GB" sz="1200" dirty="0">
-                <a:solidFill>
-                  <a:schemeClr val="accent6">
-                    <a:lumMod val="50000"/>
+            <a:r>
+              <a:rPr lang="en-GB" sz="1400" dirty="0">
+                <a:solidFill>
+                  <a:schemeClr val="accent6">
+                    <a:lumMod val="75000"/>
                   </a:schemeClr>
                 </a:solidFill>
                 <a:latin typeface="Envy Code R" panose="02000509000000020004" pitchFamily="49" charset="0"/>
@@ -5476,10 +5638,10 @@
               <a:t>$ </a:t>
             </a:r>
             <a:r>
-              <a:rPr lang="en-GB" sz="1200" dirty="0" smtClean="0">
-                <a:solidFill>
-                  <a:schemeClr val="accent6">
-                    <a:lumMod val="50000"/>
+              <a:rPr lang="en-GB" sz="1400" dirty="0">
+                <a:solidFill>
+                  <a:schemeClr val="accent6">
+                    <a:lumMod val="75000"/>
                   </a:schemeClr>
                 </a:solidFill>
                 <a:latin typeface="Envy Code R" panose="02000509000000020004" pitchFamily="49" charset="0"/>
@@ -5488,10 +5650,10 @@
               <a:t>git </a:t>
             </a:r>
             <a:r>
-              <a:rPr lang="en-GB" sz="1200" dirty="0">
-                <a:solidFill>
-                  <a:schemeClr val="accent6">
-                    <a:lumMod val="50000"/>
+              <a:rPr lang="en-GB" sz="1400" dirty="0">
+                <a:solidFill>
+                  <a:schemeClr val="accent6">
+                    <a:lumMod val="75000"/>
                   </a:schemeClr>
                 </a:solidFill>
                 <a:latin typeface="Envy Code R" panose="02000509000000020004" pitchFamily="49" charset="0"/>
@@ -5500,10 +5662,10 @@
               <a:t>commit -m "Start developing a crazy </a:t>
             </a:r>
             <a:r>
-              <a:rPr lang="en-GB" sz="1200" dirty="0" smtClean="0">
-                <a:solidFill>
-                  <a:schemeClr val="accent6">
-                    <a:lumMod val="50000"/>
+              <a:rPr lang="en-GB" sz="1400" dirty="0">
+                <a:solidFill>
+                  <a:schemeClr val="accent6">
+                    <a:lumMod val="75000"/>
                   </a:schemeClr>
                 </a:solidFill>
                 <a:latin typeface="Envy Code R" panose="02000509000000020004" pitchFamily="49" charset="0"/>
@@ -5513,37 +5675,41 @@
             </a:r>
           </a:p>
           <a:p>
-            <a:pPr>
-              <a:spcBef>
-                <a:spcPts val="300"/>
-              </a:spcBef>
-              <a:spcAft>
-                <a:spcPts val="300"/>
-              </a:spcAft>
-            </a:pPr>
-            <a:r>
-              <a:rPr lang="en-GB" sz="1200" dirty="0" smtClean="0">
+            <a:r>
+              <a:rPr lang="en-GB" sz="1400" dirty="0">
+                <a:solidFill>
+                  <a:schemeClr val="bg1"/>
+                </a:solidFill>
                 <a:latin typeface="Envy Code R" panose="02000509000000020004" pitchFamily="49" charset="0"/>
                 <a:cs typeface="Consolas" panose="020B0609020204030204" pitchFamily="49" charset="0"/>
               </a:rPr>
               <a:t>- </a:t>
             </a:r>
             <a:r>
-              <a:rPr lang="en-GB" sz="1200" dirty="0">
+              <a:rPr lang="en-GB" sz="1400" dirty="0">
+                <a:solidFill>
+                  <a:schemeClr val="bg1"/>
+                </a:solidFill>
                 <a:latin typeface="Envy Code R" panose="02000509000000020004" pitchFamily="49" charset="0"/>
                 <a:cs typeface="Consolas" panose="020B0609020204030204" pitchFamily="49" charset="0"/>
               </a:rPr>
               <a:t>add some </a:t>
             </a:r>
             <a:r>
-              <a:rPr lang="en-GB" sz="1200" dirty="0" smtClean="0">
+              <a:rPr lang="en-GB" sz="1400" dirty="0">
+                <a:solidFill>
+                  <a:schemeClr val="bg1"/>
+                </a:solidFill>
                 <a:latin typeface="Envy Code R" panose="02000509000000020004" pitchFamily="49" charset="0"/>
                 <a:cs typeface="Consolas" panose="020B0609020204030204" pitchFamily="49" charset="0"/>
               </a:rPr>
               <a:t>more crazy stuff to </a:t>
             </a:r>
             <a:r>
-              <a:rPr lang="en-GB" sz="1200" dirty="0">
+              <a:rPr lang="en-GB" sz="1400" dirty="0">
+                <a:solidFill>
+                  <a:schemeClr val="bg1"/>
+                </a:solidFill>
                 <a:latin typeface="Envy Code R" panose="02000509000000020004" pitchFamily="49" charset="0"/>
                 <a:cs typeface="Consolas" panose="020B0609020204030204" pitchFamily="49" charset="0"/>
               </a:rPr>
@@ -5551,19 +5717,11 @@
             </a:r>
           </a:p>
           <a:p>
-            <a:pPr>
-              <a:spcBef>
-                <a:spcPts val="300"/>
-              </a:spcBef>
-              <a:spcAft>
-                <a:spcPts val="300"/>
-              </a:spcAft>
-            </a:pPr>
-            <a:r>
-              <a:rPr lang="en-GB" sz="1200" dirty="0">
-                <a:solidFill>
-                  <a:schemeClr val="accent6">
-                    <a:lumMod val="50000"/>
+            <a:r>
+              <a:rPr lang="en-GB" sz="1400" dirty="0">
+                <a:solidFill>
+                  <a:schemeClr val="accent6">
+                    <a:lumMod val="75000"/>
                   </a:schemeClr>
                 </a:solidFill>
                 <a:latin typeface="Envy Code R" panose="02000509000000020004" pitchFamily="49" charset="0"/>
@@ -5573,19 +5731,11 @@
             </a:r>
           </a:p>
           <a:p>
-            <a:pPr>
-              <a:spcBef>
-                <a:spcPts val="300"/>
-              </a:spcBef>
-              <a:spcAft>
-                <a:spcPts val="300"/>
-              </a:spcAft>
-            </a:pPr>
-            <a:r>
-              <a:rPr lang="en-GB" sz="1200" dirty="0">
-                <a:solidFill>
-                  <a:schemeClr val="accent6">
-                    <a:lumMod val="50000"/>
+            <a:r>
+              <a:rPr lang="en-GB" sz="1400" dirty="0">
+                <a:solidFill>
+                  <a:schemeClr val="accent6">
+                    <a:lumMod val="75000"/>
                   </a:schemeClr>
                 </a:solidFill>
                 <a:latin typeface="Envy Code R" panose="02000509000000020004" pitchFamily="49" charset="0"/>
@@ -5594,10 +5744,10 @@
               <a:t>$ git commit -m </a:t>
             </a:r>
             <a:r>
-              <a:rPr lang="en-GB" sz="1200" dirty="0" smtClean="0">
-                <a:solidFill>
-                  <a:schemeClr val="accent6">
-                    <a:lumMod val="50000"/>
+              <a:rPr lang="en-GB" sz="1400" dirty="0">
+                <a:solidFill>
+                  <a:schemeClr val="accent6">
+                    <a:lumMod val="75000"/>
                   </a:schemeClr>
                 </a:solidFill>
                 <a:latin typeface="Envy Code R" panose="02000509000000020004" pitchFamily="49" charset="0"/>
@@ -5607,47 +5757,40 @@
             </a:r>
           </a:p>
           <a:p>
-            <a:pPr>
-              <a:spcBef>
-                <a:spcPts val="300"/>
-              </a:spcBef>
-              <a:spcAft>
-                <a:spcPts val="300"/>
-              </a:spcAft>
-            </a:pPr>
-            <a:r>
-              <a:rPr lang="en-GB" sz="1200" dirty="0">
+            <a:r>
+              <a:rPr lang="en-GB" sz="1400" dirty="0">
+                <a:solidFill>
+                  <a:schemeClr val="bg1"/>
+                </a:solidFill>
                 <a:latin typeface="Envy Code R" panose="02000509000000020004" pitchFamily="49" charset="0"/>
                 <a:cs typeface="Consolas" panose="020B0609020204030204" pitchFamily="49" charset="0"/>
               </a:rPr>
               <a:t>- </a:t>
             </a:r>
             <a:r>
-              <a:rPr lang="en-GB" sz="1200" dirty="0" smtClean="0">
+              <a:rPr lang="en-GB" sz="1400" dirty="0">
+                <a:solidFill>
+                  <a:schemeClr val="bg1"/>
+                </a:solidFill>
                 <a:latin typeface="Envy Code R" panose="02000509000000020004" pitchFamily="49" charset="0"/>
                 <a:cs typeface="Consolas" panose="020B0609020204030204" pitchFamily="49" charset="0"/>
               </a:rPr>
               <a:t>this feature is not going to work! reset back!</a:t>
             </a:r>
-            <a:endParaRPr lang="en-GB" sz="1200" dirty="0">
+            <a:endParaRPr lang="en-GB" sz="1400" dirty="0">
+              <a:solidFill>
+                <a:schemeClr val="bg1"/>
+              </a:solidFill>
               <a:latin typeface="Envy Code R" panose="02000509000000020004" pitchFamily="49" charset="0"/>
               <a:cs typeface="Consolas" panose="020B0609020204030204" pitchFamily="49" charset="0"/>
             </a:endParaRPr>
           </a:p>
           <a:p>
-            <a:pPr>
-              <a:spcBef>
-                <a:spcPts val="300"/>
-              </a:spcBef>
-              <a:spcAft>
-                <a:spcPts val="300"/>
-              </a:spcAft>
-            </a:pPr>
-            <a:r>
-              <a:rPr lang="en-GB" sz="1200" dirty="0">
-                <a:solidFill>
-                  <a:schemeClr val="accent6">
-                    <a:lumMod val="50000"/>
+            <a:r>
+              <a:rPr lang="en-GB" sz="1400" dirty="0">
+                <a:solidFill>
+                  <a:schemeClr val="accent6">
+                    <a:lumMod val="75000"/>
                   </a:schemeClr>
                 </a:solidFill>
                 <a:latin typeface="Envy Code R" panose="02000509000000020004" pitchFamily="49" charset="0"/>
@@ -5656,10 +5799,10 @@
               <a:t>$ git reset --hard </a:t>
             </a:r>
             <a:r>
-              <a:rPr lang="en-GB" sz="1200" dirty="0" smtClean="0">
-                <a:solidFill>
-                  <a:schemeClr val="accent6">
-                    <a:lumMod val="50000"/>
+              <a:rPr lang="en-GB" sz="1400" dirty="0">
+                <a:solidFill>
+                  <a:schemeClr val="accent6">
+                    <a:lumMod val="75000"/>
                   </a:schemeClr>
                 </a:solidFill>
                 <a:latin typeface="Envy Code R" panose="02000509000000020004" pitchFamily="49" charset="0"/>
@@ -5667,10 +5810,10 @@
               </a:rPr>
               <a:t>HEAD^^</a:t>
             </a:r>
-            <a:endParaRPr lang="en-GB" sz="1200" dirty="0">
+            <a:endParaRPr lang="en-GB" sz="1400" dirty="0">
               <a:solidFill>
                 <a:schemeClr val="accent6">
-                  <a:lumMod val="50000"/>
+                  <a:lumMod val="75000"/>
                 </a:schemeClr>
               </a:solidFill>
               <a:latin typeface="Envy Code R" panose="02000509000000020004" pitchFamily="49" charset="0"/>
@@ -5687,7 +5830,7 @@
     </p:extLst>
   </p:cSld>
   <p:clrMapOvr>
-    <a:masterClrMapping/>
+    <a:overrideClrMapping bg1="lt1" tx1="dk1" bg2="lt2" tx2="dk2" accent1="accent1" accent2="accent2" accent3="accent3" accent4="accent4" accent5="accent5" accent6="accent6" hlink="hlink" folHlink="folHlink"/>
   </p:clrMapOvr>
 </p:sld>
 </file>
@@ -6532,4 +6675,90 @@
   <a:objectDefaults/>
   <a:extraClrSchemeLst/>
 </a:theme>
+</file>
+
+<file path=ppt/theme/themeOverride1.xml><?xml version="1.0" encoding="utf-8"?>
+<a:themeOverride xmlns:a="http://schemas.openxmlformats.org/drawingml/2006/main">
+  <a:clrScheme name="Office">
+    <a:dk1>
+      <a:sysClr val="windowText" lastClr="000000"/>
+    </a:dk1>
+    <a:lt1>
+      <a:sysClr val="window" lastClr="FFFFFF"/>
+    </a:lt1>
+    <a:dk2>
+      <a:srgbClr val="1F497D"/>
+    </a:dk2>
+    <a:lt2>
+      <a:srgbClr val="EEECE1"/>
+    </a:lt2>
+    <a:accent1>
+      <a:srgbClr val="4F81BD"/>
+    </a:accent1>
+    <a:accent2>
+      <a:srgbClr val="C0504D"/>
+    </a:accent2>
+    <a:accent3>
+      <a:srgbClr val="9BBB59"/>
+    </a:accent3>
+    <a:accent4>
+      <a:srgbClr val="8064A2"/>
+    </a:accent4>
+    <a:accent5>
+      <a:srgbClr val="4BACC6"/>
+    </a:accent5>
+    <a:accent6>
+      <a:srgbClr val="F79646"/>
+    </a:accent6>
+    <a:hlink>
+      <a:srgbClr val="0000FF"/>
+    </a:hlink>
+    <a:folHlink>
+      <a:srgbClr val="800080"/>
+    </a:folHlink>
+  </a:clrScheme>
+</a:themeOverride>
+</file>
+
+<file path=ppt/theme/themeOverride2.xml><?xml version="1.0" encoding="utf-8"?>
+<a:themeOverride xmlns:a="http://schemas.openxmlformats.org/drawingml/2006/main">
+  <a:clrScheme name="Office">
+    <a:dk1>
+      <a:sysClr val="windowText" lastClr="000000"/>
+    </a:dk1>
+    <a:lt1>
+      <a:sysClr val="window" lastClr="FFFFFF"/>
+    </a:lt1>
+    <a:dk2>
+      <a:srgbClr val="1F497D"/>
+    </a:dk2>
+    <a:lt2>
+      <a:srgbClr val="EEECE1"/>
+    </a:lt2>
+    <a:accent1>
+      <a:srgbClr val="4F81BD"/>
+    </a:accent1>
+    <a:accent2>
+      <a:srgbClr val="C0504D"/>
+    </a:accent2>
+    <a:accent3>
+      <a:srgbClr val="9BBB59"/>
+    </a:accent3>
+    <a:accent4>
+      <a:srgbClr val="8064A2"/>
+    </a:accent4>
+    <a:accent5>
+      <a:srgbClr val="4BACC6"/>
+    </a:accent5>
+    <a:accent6>
+      <a:srgbClr val="F79646"/>
+    </a:accent6>
+    <a:hlink>
+      <a:srgbClr val="0000FF"/>
+    </a:hlink>
+    <a:folHlink>
+      <a:srgbClr val="800080"/>
+    </a:folHlink>
+  </a:clrScheme>
+</a:themeOverride>
 </file>
</xml_diff>

<commit_message>
archive before dumbing down contents
</commit_message>
<xml_diff>
--- a/slides/add_undo.pptx
+++ b/slides/add_undo.pptx
@@ -13,7 +13,8 @@
     <p:sldId id="262" r:id="rId7"/>
     <p:sldId id="263" r:id="rId8"/>
     <p:sldId id="264" r:id="rId9"/>
-    <p:sldId id="265" r:id="rId10"/>
+    <p:sldId id="266" r:id="rId10"/>
+    <p:sldId id="265" r:id="rId11"/>
   </p:sldIdLst>
   <p:sldSz cx="9144000" cy="6858000" type="screen4x3"/>
   <p:notesSz cx="6858000" cy="9144000"/>
@@ -296,7 +297,7 @@
           <a:p>
             <a:fld id="{FEB7EDEF-E75A-4013-854A-C50ED3F477DD}" type="datetimeFigureOut">
               <a:rPr lang="en-GB" smtClean="0"/>
-              <a:t>28/09/2013</a:t>
+              <a:t>30/09/2013</a:t>
             </a:fld>
             <a:endParaRPr lang="en-GB"/>
           </a:p>
@@ -466,7 +467,7 @@
           <a:p>
             <a:fld id="{FEB7EDEF-E75A-4013-854A-C50ED3F477DD}" type="datetimeFigureOut">
               <a:rPr lang="en-GB" smtClean="0"/>
-              <a:t>28/09/2013</a:t>
+              <a:t>30/09/2013</a:t>
             </a:fld>
             <a:endParaRPr lang="en-GB"/>
           </a:p>
@@ -646,7 +647,7 @@
           <a:p>
             <a:fld id="{FEB7EDEF-E75A-4013-854A-C50ED3F477DD}" type="datetimeFigureOut">
               <a:rPr lang="en-GB" smtClean="0"/>
-              <a:t>28/09/2013</a:t>
+              <a:t>30/09/2013</a:t>
             </a:fld>
             <a:endParaRPr lang="en-GB"/>
           </a:p>
@@ -816,7 +817,7 @@
           <a:p>
             <a:fld id="{FEB7EDEF-E75A-4013-854A-C50ED3F477DD}" type="datetimeFigureOut">
               <a:rPr lang="en-GB" smtClean="0"/>
-              <a:t>28/09/2013</a:t>
+              <a:t>30/09/2013</a:t>
             </a:fld>
             <a:endParaRPr lang="en-GB"/>
           </a:p>
@@ -1062,7 +1063,7 @@
           <a:p>
             <a:fld id="{FEB7EDEF-E75A-4013-854A-C50ED3F477DD}" type="datetimeFigureOut">
               <a:rPr lang="en-GB" smtClean="0"/>
-              <a:t>28/09/2013</a:t>
+              <a:t>30/09/2013</a:t>
             </a:fld>
             <a:endParaRPr lang="en-GB"/>
           </a:p>
@@ -1350,7 +1351,7 @@
           <a:p>
             <a:fld id="{FEB7EDEF-E75A-4013-854A-C50ED3F477DD}" type="datetimeFigureOut">
               <a:rPr lang="en-GB" smtClean="0"/>
-              <a:t>28/09/2013</a:t>
+              <a:t>30/09/2013</a:t>
             </a:fld>
             <a:endParaRPr lang="en-GB"/>
           </a:p>
@@ -1772,7 +1773,7 @@
           <a:p>
             <a:fld id="{FEB7EDEF-E75A-4013-854A-C50ED3F477DD}" type="datetimeFigureOut">
               <a:rPr lang="en-GB" smtClean="0"/>
-              <a:t>28/09/2013</a:t>
+              <a:t>30/09/2013</a:t>
             </a:fld>
             <a:endParaRPr lang="en-GB"/>
           </a:p>
@@ -1890,7 +1891,7 @@
           <a:p>
             <a:fld id="{FEB7EDEF-E75A-4013-854A-C50ED3F477DD}" type="datetimeFigureOut">
               <a:rPr lang="en-GB" smtClean="0"/>
-              <a:t>28/09/2013</a:t>
+              <a:t>30/09/2013</a:t>
             </a:fld>
             <a:endParaRPr lang="en-GB"/>
           </a:p>
@@ -1985,7 +1986,7 @@
           <a:p>
             <a:fld id="{FEB7EDEF-E75A-4013-854A-C50ED3F477DD}" type="datetimeFigureOut">
               <a:rPr lang="en-GB" smtClean="0"/>
-              <a:t>28/09/2013</a:t>
+              <a:t>30/09/2013</a:t>
             </a:fld>
             <a:endParaRPr lang="en-GB"/>
           </a:p>
@@ -2262,7 +2263,7 @@
           <a:p>
             <a:fld id="{FEB7EDEF-E75A-4013-854A-C50ED3F477DD}" type="datetimeFigureOut">
               <a:rPr lang="en-GB" smtClean="0"/>
-              <a:t>28/09/2013</a:t>
+              <a:t>30/09/2013</a:t>
             </a:fld>
             <a:endParaRPr lang="en-GB"/>
           </a:p>
@@ -2515,7 +2516,7 @@
           <a:p>
             <a:fld id="{FEB7EDEF-E75A-4013-854A-C50ED3F477DD}" type="datetimeFigureOut">
               <a:rPr lang="en-GB" smtClean="0"/>
-              <a:t>28/09/2013</a:t>
+              <a:t>30/09/2013</a:t>
             </a:fld>
             <a:endParaRPr lang="en-GB"/>
           </a:p>
@@ -2728,7 +2729,7 @@
           <a:p>
             <a:fld id="{FEB7EDEF-E75A-4013-854A-C50ED3F477DD}" type="datetimeFigureOut">
               <a:rPr lang="en-GB" smtClean="0"/>
-              <a:t>28/09/2013</a:t>
+              <a:t>30/09/2013</a:t>
             </a:fld>
             <a:endParaRPr lang="en-GB"/>
           </a:p>
@@ -3170,6 +3171,112 @@
 </p:sld>
 </file>
 
+<file path=ppt/slides/slide10.xml><?xml version="1.0" encoding="utf-8"?>
+<p:sld xmlns:a="http://schemas.openxmlformats.org/drawingml/2006/main" xmlns:r="http://schemas.openxmlformats.org/officeDocument/2006/relationships" xmlns:p="http://schemas.openxmlformats.org/presentationml/2006/main">
+  <p:cSld>
+    <p:spTree>
+      <p:nvGrpSpPr>
+        <p:cNvPr id="1" name=""/>
+        <p:cNvGrpSpPr/>
+        <p:nvPr/>
+      </p:nvGrpSpPr>
+      <p:grpSpPr>
+        <a:xfrm>
+          <a:off x="0" y="0"/>
+          <a:ext cx="0" cy="0"/>
+          <a:chOff x="0" y="0"/>
+          <a:chExt cx="0" cy="0"/>
+        </a:xfrm>
+      </p:grpSpPr>
+      <p:sp>
+        <p:nvSpPr>
+          <p:cNvPr id="2" name="Title 1"/>
+          <p:cNvSpPr>
+            <a:spLocks noGrp="1"/>
+          </p:cNvSpPr>
+          <p:nvPr>
+            <p:ph type="title"/>
+          </p:nvPr>
+        </p:nvSpPr>
+        <p:spPr/>
+        <p:txBody>
+          <a:bodyPr/>
+          <a:lstStyle/>
+          <a:p>
+            <a:r>
+              <a:rPr lang="en-GB" dirty="0" smtClean="0"/>
+              <a:t>Further Reading</a:t>
+            </a:r>
+            <a:endParaRPr lang="en-GB" dirty="0"/>
+          </a:p>
+        </p:txBody>
+      </p:sp>
+      <p:sp>
+        <p:nvSpPr>
+          <p:cNvPr id="3" name="Content Placeholder 2"/>
+          <p:cNvSpPr>
+            <a:spLocks noGrp="1"/>
+          </p:cNvSpPr>
+          <p:nvPr>
+            <p:ph idx="1"/>
+          </p:nvPr>
+        </p:nvSpPr>
+        <p:spPr/>
+        <p:txBody>
+          <a:bodyPr/>
+          <a:lstStyle/>
+          <a:p>
+            <a:r>
+              <a:rPr lang="en-GB" dirty="0"/>
+              <a:t>http://git-scm.com/book/en/Git-Basics-Undoing-Things</a:t>
+            </a:r>
+          </a:p>
+          <a:p>
+            <a:r>
+              <a:rPr lang="en-GB" dirty="0" smtClean="0"/>
+              <a:t>https</a:t>
+            </a:r>
+            <a:r>
+              <a:rPr lang="en-GB" dirty="0"/>
+              <a:t>://</a:t>
+            </a:r>
+            <a:r>
+              <a:rPr lang="en-GB" dirty="0" smtClean="0"/>
+              <a:t>www.atlassian.com/git/tutorial/undoing-changes</a:t>
+            </a:r>
+          </a:p>
+          <a:p>
+            <a:r>
+              <a:rPr lang="en-GB" dirty="0"/>
+              <a:t>http://</a:t>
+            </a:r>
+            <a:r>
+              <a:rPr lang="en-GB" dirty="0" smtClean="0"/>
+              <a:t>gitimmersion.com/lab_06.html</a:t>
+            </a:r>
+          </a:p>
+          <a:p>
+            <a:r>
+              <a:rPr lang="en-GB" dirty="0"/>
+              <a:t>https://help.github.com/articles/ignoring-files</a:t>
+            </a:r>
+            <a:endParaRPr lang="en-GB" dirty="0"/>
+          </a:p>
+        </p:txBody>
+      </p:sp>
+    </p:spTree>
+    <p:extLst>
+      <p:ext uri="{BB962C8B-B14F-4D97-AF65-F5344CB8AC3E}">
+        <p14:creationId xmlns:p14="http://schemas.microsoft.com/office/powerpoint/2010/main" val="2464727958"/>
+      </p:ext>
+    </p:extLst>
+  </p:cSld>
+  <p:clrMapOvr>
+    <a:masterClrMapping/>
+  </p:clrMapOvr>
+</p:sld>
+</file>
+
 <file path=ppt/slides/slide2.xml><?xml version="1.0" encoding="utf-8"?>
 <p:sld xmlns:a="http://schemas.openxmlformats.org/drawingml/2006/main" xmlns:r="http://schemas.openxmlformats.org/officeDocument/2006/relationships" xmlns:p="http://schemas.openxmlformats.org/presentationml/2006/main">
   <p:cSld>
@@ -3259,18 +3366,7 @@
                 </a:solidFill>
                 <a:latin typeface="Envy Code R" panose="02000509000000020004" pitchFamily="49" charset="0"/>
               </a:rPr>
-              <a:t>git </a:t>
-            </a:r>
-            <a:r>
-              <a:rPr lang="en-GB" dirty="0" smtClean="0">
-                <a:solidFill>
-                  <a:schemeClr val="accent6">
-                    <a:lumMod val="50000"/>
-                  </a:schemeClr>
-                </a:solidFill>
-                <a:latin typeface="Envy Code R" panose="02000509000000020004" pitchFamily="49" charset="0"/>
-              </a:rPr>
-              <a:t>add &lt;file&gt;</a:t>
+              <a:t>git add &lt;file&gt;</a:t>
             </a:r>
           </a:p>
           <a:p>
@@ -5635,11 +5731,25 @@
                 <a:latin typeface="Envy Code R" panose="02000509000000020004" pitchFamily="49" charset="0"/>
                 <a:cs typeface="Consolas" panose="020B0609020204030204" pitchFamily="49" charset="0"/>
               </a:rPr>
-              <a:t>$ </a:t>
-            </a:r>
+              <a:t>$ git commit -m "Start developing a crazy feature“</a:t>
+            </a:r>
+          </a:p>
+          <a:p>
             <a:r>
               <a:rPr lang="en-GB" sz="1400" dirty="0">
                 <a:solidFill>
+                  <a:schemeClr val="bg1"/>
+                </a:solidFill>
+                <a:latin typeface="Envy Code R" panose="02000509000000020004" pitchFamily="49" charset="0"/>
+                <a:cs typeface="Consolas" panose="020B0609020204030204" pitchFamily="49" charset="0"/>
+              </a:rPr>
+              <a:t>- add some more crazy stuff to foo</a:t>
+            </a:r>
+          </a:p>
+          <a:p>
+            <a:r>
+              <a:rPr lang="en-GB" sz="1400" dirty="0">
+                <a:solidFill>
                   <a:schemeClr val="accent6">
                     <a:lumMod val="75000"/>
                   </a:schemeClr>
@@ -5647,8 +5757,10 @@
                 <a:latin typeface="Envy Code R" panose="02000509000000020004" pitchFamily="49" charset="0"/>
                 <a:cs typeface="Consolas" panose="020B0609020204030204" pitchFamily="49" charset="0"/>
               </a:rPr>
-              <a:t>git </a:t>
-            </a:r>
+              <a:t>$ git add foo</a:t>
+            </a:r>
+          </a:p>
+          <a:p>
             <a:r>
               <a:rPr lang="en-GB" sz="1400" dirty="0">
                 <a:solidFill>
@@ -5659,11 +5771,25 @@
                 <a:latin typeface="Envy Code R" panose="02000509000000020004" pitchFamily="49" charset="0"/>
                 <a:cs typeface="Consolas" panose="020B0609020204030204" pitchFamily="49" charset="0"/>
               </a:rPr>
-              <a:t>commit -m "Start developing a crazy </a:t>
-            </a:r>
+              <a:t>$ git commit -m “Still developing the crazy feature“</a:t>
+            </a:r>
+          </a:p>
+          <a:p>
             <a:r>
               <a:rPr lang="en-GB" sz="1400" dirty="0">
                 <a:solidFill>
+                  <a:schemeClr val="bg1"/>
+                </a:solidFill>
+                <a:latin typeface="Envy Code R" panose="02000509000000020004" pitchFamily="49" charset="0"/>
+                <a:cs typeface="Consolas" panose="020B0609020204030204" pitchFamily="49" charset="0"/>
+              </a:rPr>
+              <a:t>- this feature is not going to work! reset back!</a:t>
+            </a:r>
+          </a:p>
+          <a:p>
+            <a:r>
+              <a:rPr lang="en-GB" sz="1400" dirty="0">
+                <a:solidFill>
                   <a:schemeClr val="accent6">
                     <a:lumMod val="75000"/>
                   </a:schemeClr>
@@ -5671,154 +5797,8 @@
                 <a:latin typeface="Envy Code R" panose="02000509000000020004" pitchFamily="49" charset="0"/>
                 <a:cs typeface="Consolas" panose="020B0609020204030204" pitchFamily="49" charset="0"/>
               </a:rPr>
-              <a:t>feature“</a:t>
-            </a:r>
-          </a:p>
-          <a:p>
-            <a:r>
-              <a:rPr lang="en-GB" sz="1400" dirty="0">
-                <a:solidFill>
-                  <a:schemeClr val="bg1"/>
-                </a:solidFill>
-                <a:latin typeface="Envy Code R" panose="02000509000000020004" pitchFamily="49" charset="0"/>
-                <a:cs typeface="Consolas" panose="020B0609020204030204" pitchFamily="49" charset="0"/>
-              </a:rPr>
-              <a:t>- </a:t>
-            </a:r>
-            <a:r>
-              <a:rPr lang="en-GB" sz="1400" dirty="0">
-                <a:solidFill>
-                  <a:schemeClr val="bg1"/>
-                </a:solidFill>
-                <a:latin typeface="Envy Code R" panose="02000509000000020004" pitchFamily="49" charset="0"/>
-                <a:cs typeface="Consolas" panose="020B0609020204030204" pitchFamily="49" charset="0"/>
-              </a:rPr>
-              <a:t>add some </a:t>
-            </a:r>
-            <a:r>
-              <a:rPr lang="en-GB" sz="1400" dirty="0">
-                <a:solidFill>
-                  <a:schemeClr val="bg1"/>
-                </a:solidFill>
-                <a:latin typeface="Envy Code R" panose="02000509000000020004" pitchFamily="49" charset="0"/>
-                <a:cs typeface="Consolas" panose="020B0609020204030204" pitchFamily="49" charset="0"/>
-              </a:rPr>
-              <a:t>more crazy stuff to </a:t>
-            </a:r>
-            <a:r>
-              <a:rPr lang="en-GB" sz="1400" dirty="0">
-                <a:solidFill>
-                  <a:schemeClr val="bg1"/>
-                </a:solidFill>
-                <a:latin typeface="Envy Code R" panose="02000509000000020004" pitchFamily="49" charset="0"/>
-                <a:cs typeface="Consolas" panose="020B0609020204030204" pitchFamily="49" charset="0"/>
-              </a:rPr>
-              <a:t>foo</a:t>
-            </a:r>
-          </a:p>
-          <a:p>
-            <a:r>
-              <a:rPr lang="en-GB" sz="1400" dirty="0">
-                <a:solidFill>
-                  <a:schemeClr val="accent6">
-                    <a:lumMod val="75000"/>
-                  </a:schemeClr>
-                </a:solidFill>
-                <a:latin typeface="Envy Code R" panose="02000509000000020004" pitchFamily="49" charset="0"/>
-                <a:cs typeface="Consolas" panose="020B0609020204030204" pitchFamily="49" charset="0"/>
-              </a:rPr>
-              <a:t>$ git add foo</a:t>
-            </a:r>
-          </a:p>
-          <a:p>
-            <a:r>
-              <a:rPr lang="en-GB" sz="1400" dirty="0">
-                <a:solidFill>
-                  <a:schemeClr val="accent6">
-                    <a:lumMod val="75000"/>
-                  </a:schemeClr>
-                </a:solidFill>
-                <a:latin typeface="Envy Code R" panose="02000509000000020004" pitchFamily="49" charset="0"/>
-                <a:cs typeface="Consolas" panose="020B0609020204030204" pitchFamily="49" charset="0"/>
-              </a:rPr>
-              <a:t>$ git commit -m </a:t>
-            </a:r>
-            <a:r>
-              <a:rPr lang="en-GB" sz="1400" dirty="0">
-                <a:solidFill>
-                  <a:schemeClr val="accent6">
-                    <a:lumMod val="75000"/>
-                  </a:schemeClr>
-                </a:solidFill>
-                <a:latin typeface="Envy Code R" panose="02000509000000020004" pitchFamily="49" charset="0"/>
-                <a:cs typeface="Consolas" panose="020B0609020204030204" pitchFamily="49" charset="0"/>
-              </a:rPr>
-              <a:t>“Still developing the crazy feature“</a:t>
-            </a:r>
-          </a:p>
-          <a:p>
-            <a:r>
-              <a:rPr lang="en-GB" sz="1400" dirty="0">
-                <a:solidFill>
-                  <a:schemeClr val="bg1"/>
-                </a:solidFill>
-                <a:latin typeface="Envy Code R" panose="02000509000000020004" pitchFamily="49" charset="0"/>
-                <a:cs typeface="Consolas" panose="020B0609020204030204" pitchFamily="49" charset="0"/>
-              </a:rPr>
-              <a:t>- </a:t>
-            </a:r>
-            <a:r>
-              <a:rPr lang="en-GB" sz="1400" dirty="0">
-                <a:solidFill>
-                  <a:schemeClr val="bg1"/>
-                </a:solidFill>
-                <a:latin typeface="Envy Code R" panose="02000509000000020004" pitchFamily="49" charset="0"/>
-                <a:cs typeface="Consolas" panose="020B0609020204030204" pitchFamily="49" charset="0"/>
-              </a:rPr>
-              <a:t>this feature is not going to work! reset back!</a:t>
-            </a:r>
-            <a:endParaRPr lang="en-GB" sz="1400" dirty="0">
-              <a:solidFill>
-                <a:schemeClr val="bg1"/>
-              </a:solidFill>
-              <a:latin typeface="Envy Code R" panose="02000509000000020004" pitchFamily="49" charset="0"/>
-              <a:cs typeface="Consolas" panose="020B0609020204030204" pitchFamily="49" charset="0"/>
-            </a:endParaRPr>
-          </a:p>
-          <a:p>
-            <a:r>
-              <a:rPr lang="en-GB" sz="1400" dirty="0">
-                <a:solidFill>
-                  <a:schemeClr val="accent6">
-                    <a:lumMod val="75000"/>
-                  </a:schemeClr>
-                </a:solidFill>
-                <a:latin typeface="Envy Code R" panose="02000509000000020004" pitchFamily="49" charset="0"/>
-                <a:cs typeface="Consolas" panose="020B0609020204030204" pitchFamily="49" charset="0"/>
-              </a:rPr>
-              <a:t>$ git reset --hard </a:t>
-            </a:r>
-            <a:r>
-              <a:rPr lang="en-GB" sz="1400" dirty="0">
-                <a:solidFill>
-                  <a:schemeClr val="accent6">
-                    <a:lumMod val="75000"/>
-                  </a:schemeClr>
-                </a:solidFill>
-                <a:latin typeface="Envy Code R" panose="02000509000000020004" pitchFamily="49" charset="0"/>
-                <a:cs typeface="Consolas" panose="020B0609020204030204" pitchFamily="49" charset="0"/>
-              </a:rPr>
-              <a:t>HEAD^^</a:t>
-            </a:r>
-            <a:endParaRPr lang="en-GB" sz="1400" dirty="0">
-              <a:solidFill>
-                <a:schemeClr val="accent6">
-                  <a:lumMod val="75000"/>
-                </a:schemeClr>
-              </a:solidFill>
-              <a:latin typeface="Envy Code R" panose="02000509000000020004" pitchFamily="49" charset="0"/>
-              <a:cs typeface="Consolas" panose="020B0609020204030204" pitchFamily="49" charset="0"/>
-            </a:endParaRPr>
+              <a:t>$ git reset --hard HEAD^^</a:t>
+            </a:r>
           </a:p>
         </p:txBody>
       </p:sp>
@@ -6329,9 +6309,14 @@
           <a:bodyPr/>
           <a:lstStyle/>
           <a:p>
+            <a:pPr fontAlgn="base"/>
+            <a:r>
+              <a:rPr lang="en-GB" dirty="0"/>
+              <a:t>Ignoring </a:t>
+            </a:r>
             <a:r>
               <a:rPr lang="en-GB" dirty="0" smtClean="0"/>
-              <a:t>Further Reading</a:t>
+              <a:t>Files</a:t>
             </a:r>
             <a:endParaRPr lang="en-GB" dirty="0"/>
           </a:p>
@@ -6353,36 +6338,1487 @@
           <a:lstStyle/>
           <a:p>
             <a:r>
+              <a:rPr lang="en-GB" dirty="0" smtClean="0"/>
+              <a:t>Git checks a file named </a:t>
+            </a:r>
+            <a:r>
+              <a:rPr lang="en-GB" dirty="0" smtClean="0">
+                <a:solidFill>
+                  <a:schemeClr val="accent6">
+                    <a:lumMod val="50000"/>
+                  </a:schemeClr>
+                </a:solidFill>
+                <a:latin typeface="Envy Code R" panose="02000509000000020004" pitchFamily="49" charset="0"/>
+              </a:rPr>
+              <a:t>.</a:t>
+            </a:r>
+            <a:r>
+              <a:rPr lang="en-GB" dirty="0" err="1" smtClean="0">
+                <a:solidFill>
+                  <a:schemeClr val="accent6">
+                    <a:lumMod val="50000"/>
+                  </a:schemeClr>
+                </a:solidFill>
+                <a:latin typeface="Envy Code R" panose="02000509000000020004" pitchFamily="49" charset="0"/>
+              </a:rPr>
+              <a:t>gitignore</a:t>
+            </a:r>
+            <a:r>
+              <a:rPr lang="en-GB" dirty="0" smtClean="0"/>
+              <a:t> to determine files to exclude from tracking.</a:t>
+            </a:r>
+          </a:p>
+          <a:p>
+            <a:r>
+              <a:rPr lang="en-GB" dirty="0" smtClean="0"/>
+              <a:t>GitHub offers means</a:t>
+            </a:r>
+            <a:br>
+              <a:rPr lang="en-GB" dirty="0" smtClean="0"/>
+            </a:br>
+            <a:r>
+              <a:rPr lang="en-GB" dirty="0" smtClean="0"/>
+              <a:t>to generate suitable</a:t>
+            </a:r>
+            <a:br>
+              <a:rPr lang="en-GB" dirty="0" smtClean="0"/>
+            </a:br>
+            <a:r>
+              <a:rPr lang="en-GB" dirty="0">
+                <a:solidFill>
+                  <a:schemeClr val="accent6">
+                    <a:lumMod val="50000"/>
+                  </a:schemeClr>
+                </a:solidFill>
+                <a:latin typeface="Envy Code R" panose="02000509000000020004" pitchFamily="49" charset="0"/>
+              </a:rPr>
+              <a:t>.</a:t>
+            </a:r>
+            <a:r>
+              <a:rPr lang="en-GB" dirty="0" err="1">
+                <a:solidFill>
+                  <a:schemeClr val="accent6">
+                    <a:lumMod val="50000"/>
+                  </a:schemeClr>
+                </a:solidFill>
+                <a:latin typeface="Envy Code R" panose="02000509000000020004" pitchFamily="49" charset="0"/>
+              </a:rPr>
+              <a:t>gitignore</a:t>
+            </a:r>
+            <a:r>
               <a:rPr lang="en-GB" dirty="0"/>
-              <a:t>http://git-scm.com/book/en/Git-Basics-Undoing-Things</a:t>
-            </a:r>
-          </a:p>
-          <a:p>
+              <a:t> </a:t>
+            </a:r>
             <a:r>
               <a:rPr lang="en-GB" dirty="0" smtClean="0"/>
-              <a:t>https</a:t>
-            </a:r>
-            <a:r>
-              <a:rPr lang="en-GB" dirty="0"/>
-              <a:t>://</a:t>
-            </a:r>
-            <a:r>
+              <a:t>files</a:t>
+            </a:r>
+            <a:br>
               <a:rPr lang="en-GB" dirty="0" smtClean="0"/>
-              <a:t>www.atlassian.com/git/tutorial/undoing-changes</a:t>
-            </a:r>
-          </a:p>
-          <a:p>
-            <a:r>
-              <a:rPr lang="en-GB" dirty="0"/>
-              <a:t>http://gitimmersion.com/lab_06.html</a:t>
-            </a:r>
+            </a:br>
+            <a:r>
+              <a:rPr lang="en-GB" dirty="0" smtClean="0"/>
+              <a:t>automatically.</a:t>
+            </a:r>
+          </a:p>
+          <a:p>
+            <a:r>
+              <a:rPr lang="en-GB" dirty="0" smtClean="0"/>
+              <a:t>Supports </a:t>
+            </a:r>
+            <a:r>
+              <a:rPr lang="en-GB" dirty="0" err="1" smtClean="0"/>
+              <a:t>RegExp</a:t>
+            </a:r>
+            <a:r>
+              <a:rPr lang="en-GB" dirty="0" smtClean="0"/>
+              <a:t> and</a:t>
+            </a:r>
+            <a:br>
+              <a:rPr lang="en-GB" dirty="0" smtClean="0"/>
+            </a:br>
+            <a:r>
+              <a:rPr lang="en-GB" dirty="0" smtClean="0"/>
+              <a:t>per-directory </a:t>
+            </a:r>
+            <a:r>
+              <a:rPr lang="en-GB" dirty="0" err="1" smtClean="0"/>
+              <a:t>config</a:t>
+            </a:r>
+            <a:r>
+              <a:rPr lang="en-GB" dirty="0" smtClean="0"/>
+              <a:t>.</a:t>
+            </a:r>
+            <a:endParaRPr lang="en-GB" dirty="0"/>
+          </a:p>
+        </p:txBody>
+      </p:sp>
+      <p:sp>
+        <p:nvSpPr>
+          <p:cNvPr id="5" name="Rectangle 2"/>
+          <p:cNvSpPr>
+            <a:spLocks noChangeArrowheads="1"/>
+          </p:cNvSpPr>
+          <p:nvPr/>
+        </p:nvSpPr>
+        <p:spPr bwMode="auto">
+          <a:xfrm>
+            <a:off x="4644008" y="2852936"/>
+            <a:ext cx="1872208" cy="3270726"/>
+          </a:xfrm>
+          <a:prstGeom prst="rect">
+            <a:avLst/>
+          </a:prstGeom>
+          <a:solidFill>
+            <a:schemeClr val="tx1"/>
+          </a:solidFill>
+          <a:ln>
+            <a:noFill/>
+          </a:ln>
+          <a:effectLst/>
+        </p:spPr>
+        <p:txBody>
+          <a:bodyPr vert="horz" wrap="square" lIns="0" tIns="65067" rIns="0" bIns="65067" numCol="1" anchor="ctr" anchorCtr="0" compatLnSpc="1">
+            <a:prstTxWarp prst="textNoShape">
+              <a:avLst/>
+            </a:prstTxWarp>
+            <a:spAutoFit/>
+          </a:bodyPr>
+          <a:lstStyle/>
+          <a:p>
+            <a:pPr marL="0" marR="0" lvl="0" indent="0" algn="l" defTabSz="914400" rtl="0" eaLnBrk="1" fontAlgn="base" latinLnBrk="0" hangingPunct="1">
+              <a:lnSpc>
+                <a:spcPct val="100000"/>
+              </a:lnSpc>
+              <a:spcBef>
+                <a:spcPct val="0"/>
+              </a:spcBef>
+              <a:spcAft>
+                <a:spcPct val="0"/>
+              </a:spcAft>
+              <a:buClrTx/>
+              <a:buSzTx/>
+              <a:buFontTx/>
+              <a:buNone/>
+              <a:tabLst/>
+            </a:pPr>
+            <a:r>
+              <a:rPr kumimoji="0" lang="en-US" altLang="en-US" sz="1200" b="0" i="0" u="none" strike="noStrike" cap="none" normalizeH="0" baseline="0" dirty="0" smtClean="0">
+                <a:ln>
+                  <a:noFill/>
+                </a:ln>
+                <a:solidFill>
+                  <a:schemeClr val="accent6">
+                    <a:lumMod val="75000"/>
+                  </a:schemeClr>
+                </a:solidFill>
+                <a:effectLst/>
+                <a:latin typeface="Arial Unicode MS"/>
+                <a:ea typeface="Monaco"/>
+                <a:cs typeface="Arial" pitchFamily="34" charset="0"/>
+              </a:rPr>
+              <a:t># Compiled source</a:t>
+            </a:r>
+            <a:r>
+              <a:rPr kumimoji="0" lang="en-US" altLang="en-US" sz="1200" b="0" i="0" u="none" strike="noStrike" cap="none" normalizeH="0" dirty="0" smtClean="0">
+                <a:ln>
+                  <a:noFill/>
+                </a:ln>
+                <a:solidFill>
+                  <a:schemeClr val="accent6">
+                    <a:lumMod val="75000"/>
+                  </a:schemeClr>
+                </a:solidFill>
+                <a:effectLst/>
+                <a:latin typeface="Arial Unicode MS"/>
+                <a:ea typeface="Monaco"/>
+                <a:cs typeface="Arial" pitchFamily="34" charset="0"/>
+              </a:rPr>
+              <a:t> </a:t>
+            </a:r>
+            <a:r>
+              <a:rPr kumimoji="0" lang="en-US" altLang="en-US" sz="1200" b="0" i="0" u="none" strike="noStrike" cap="none" normalizeH="0" baseline="0" dirty="0" smtClean="0">
+                <a:ln>
+                  <a:noFill/>
+                </a:ln>
+                <a:solidFill>
+                  <a:schemeClr val="accent6">
+                    <a:lumMod val="75000"/>
+                  </a:schemeClr>
+                </a:solidFill>
+                <a:effectLst/>
+                <a:latin typeface="Arial Unicode MS"/>
+                <a:ea typeface="Monaco"/>
+                <a:cs typeface="Arial" pitchFamily="34" charset="0"/>
+              </a:rPr>
+              <a:t>#</a:t>
+            </a:r>
+          </a:p>
+          <a:p>
+            <a:pPr marL="0" marR="0" lvl="0" indent="0" algn="l" defTabSz="914400" rtl="0" eaLnBrk="1" fontAlgn="base" latinLnBrk="0" hangingPunct="1">
+              <a:lnSpc>
+                <a:spcPct val="100000"/>
+              </a:lnSpc>
+              <a:spcBef>
+                <a:spcPct val="0"/>
+              </a:spcBef>
+              <a:spcAft>
+                <a:spcPct val="0"/>
+              </a:spcAft>
+              <a:buClrTx/>
+              <a:buSzTx/>
+              <a:buFontTx/>
+              <a:buNone/>
+              <a:tabLst/>
+            </a:pPr>
+            <a:r>
+              <a:rPr kumimoji="0" lang="en-US" altLang="en-US" sz="1200" b="0" i="0" u="none" strike="noStrike" cap="none" normalizeH="0" baseline="0" dirty="0" smtClean="0">
+                <a:ln>
+                  <a:noFill/>
+                </a:ln>
+                <a:solidFill>
+                  <a:schemeClr val="accent6">
+                    <a:lumMod val="75000"/>
+                  </a:schemeClr>
+                </a:solidFill>
+                <a:effectLst/>
+                <a:latin typeface="Arial Unicode MS"/>
+                <a:ea typeface="Monaco"/>
+                <a:cs typeface="Arial" pitchFamily="34" charset="0"/>
+              </a:rPr>
+              <a:t>###################</a:t>
+            </a:r>
+            <a:br>
+              <a:rPr kumimoji="0" lang="en-US" altLang="en-US" sz="1200" b="0" i="0" u="none" strike="noStrike" cap="none" normalizeH="0" baseline="0" dirty="0" smtClean="0">
+                <a:ln>
+                  <a:noFill/>
+                </a:ln>
+                <a:solidFill>
+                  <a:schemeClr val="accent6">
+                    <a:lumMod val="75000"/>
+                  </a:schemeClr>
+                </a:solidFill>
+                <a:effectLst/>
+                <a:latin typeface="Arial Unicode MS"/>
+                <a:ea typeface="Monaco"/>
+                <a:cs typeface="Arial" pitchFamily="34" charset="0"/>
+              </a:rPr>
+            </a:br>
+            <a:r>
+              <a:rPr kumimoji="0" lang="en-US" altLang="en-US" sz="1200" b="0" i="0" u="none" strike="noStrike" cap="none" normalizeH="0" baseline="0" dirty="0" smtClean="0">
+                <a:ln>
+                  <a:noFill/>
+                </a:ln>
+                <a:solidFill>
+                  <a:schemeClr val="accent6">
+                    <a:lumMod val="75000"/>
+                  </a:schemeClr>
+                </a:solidFill>
+                <a:effectLst/>
+                <a:latin typeface="Arial Unicode MS"/>
+                <a:ea typeface="Monaco"/>
+                <a:cs typeface="Arial" pitchFamily="34" charset="0"/>
+              </a:rPr>
+              <a:t>*.com</a:t>
+            </a:r>
+            <a:br>
+              <a:rPr kumimoji="0" lang="en-US" altLang="en-US" sz="1200" b="0" i="0" u="none" strike="noStrike" cap="none" normalizeH="0" baseline="0" dirty="0" smtClean="0">
+                <a:ln>
+                  <a:noFill/>
+                </a:ln>
+                <a:solidFill>
+                  <a:schemeClr val="accent6">
+                    <a:lumMod val="75000"/>
+                  </a:schemeClr>
+                </a:solidFill>
+                <a:effectLst/>
+                <a:latin typeface="Arial Unicode MS"/>
+                <a:ea typeface="Monaco"/>
+                <a:cs typeface="Arial" pitchFamily="34" charset="0"/>
+              </a:rPr>
+            </a:br>
+            <a:r>
+              <a:rPr kumimoji="0" lang="en-US" altLang="en-US" sz="1200" b="0" i="0" u="none" strike="noStrike" cap="none" normalizeH="0" baseline="0" dirty="0" smtClean="0">
+                <a:ln>
+                  <a:noFill/>
+                </a:ln>
+                <a:solidFill>
+                  <a:schemeClr val="accent6">
+                    <a:lumMod val="75000"/>
+                  </a:schemeClr>
+                </a:solidFill>
+                <a:effectLst/>
+                <a:latin typeface="Arial Unicode MS"/>
+                <a:ea typeface="Monaco"/>
+                <a:cs typeface="Arial" pitchFamily="34" charset="0"/>
+              </a:rPr>
+              <a:t>*.class</a:t>
+            </a:r>
+            <a:br>
+              <a:rPr kumimoji="0" lang="en-US" altLang="en-US" sz="1200" b="0" i="0" u="none" strike="noStrike" cap="none" normalizeH="0" baseline="0" dirty="0" smtClean="0">
+                <a:ln>
+                  <a:noFill/>
+                </a:ln>
+                <a:solidFill>
+                  <a:schemeClr val="accent6">
+                    <a:lumMod val="75000"/>
+                  </a:schemeClr>
+                </a:solidFill>
+                <a:effectLst/>
+                <a:latin typeface="Arial Unicode MS"/>
+                <a:ea typeface="Monaco"/>
+                <a:cs typeface="Arial" pitchFamily="34" charset="0"/>
+              </a:rPr>
+            </a:br>
+            <a:r>
+              <a:rPr kumimoji="0" lang="en-US" altLang="en-US" sz="1200" b="0" i="0" u="none" strike="noStrike" cap="none" normalizeH="0" baseline="0" dirty="0" smtClean="0">
+                <a:ln>
+                  <a:noFill/>
+                </a:ln>
+                <a:solidFill>
+                  <a:schemeClr val="accent6">
+                    <a:lumMod val="75000"/>
+                  </a:schemeClr>
+                </a:solidFill>
+                <a:effectLst/>
+                <a:latin typeface="Arial Unicode MS"/>
+                <a:ea typeface="Monaco"/>
+                <a:cs typeface="Arial" pitchFamily="34" charset="0"/>
+              </a:rPr>
+              <a:t>*.</a:t>
+            </a:r>
+            <a:r>
+              <a:rPr kumimoji="0" lang="en-US" altLang="en-US" sz="1200" b="0" i="0" u="none" strike="noStrike" cap="none" normalizeH="0" baseline="0" dirty="0" err="1" smtClean="0">
+                <a:ln>
+                  <a:noFill/>
+                </a:ln>
+                <a:solidFill>
+                  <a:schemeClr val="accent6">
+                    <a:lumMod val="75000"/>
+                  </a:schemeClr>
+                </a:solidFill>
+                <a:effectLst/>
+                <a:latin typeface="Arial Unicode MS"/>
+                <a:ea typeface="Monaco"/>
+                <a:cs typeface="Arial" pitchFamily="34" charset="0"/>
+              </a:rPr>
+              <a:t>dll</a:t>
+            </a:r>
+            <a:r>
+              <a:rPr lang="en-US" altLang="en-US" sz="1200" dirty="0">
+                <a:solidFill>
+                  <a:schemeClr val="accent6">
+                    <a:lumMod val="75000"/>
+                  </a:schemeClr>
+                </a:solidFill>
+                <a:latin typeface="Arial Unicode MS"/>
+                <a:ea typeface="Monaco"/>
+                <a:cs typeface="Arial" pitchFamily="34" charset="0"/>
+              </a:rPr>
+              <a:t/>
+            </a:r>
+            <a:br>
+              <a:rPr lang="en-US" altLang="en-US" sz="1200" dirty="0">
+                <a:solidFill>
+                  <a:schemeClr val="accent6">
+                    <a:lumMod val="75000"/>
+                  </a:schemeClr>
+                </a:solidFill>
+                <a:latin typeface="Arial Unicode MS"/>
+                <a:ea typeface="Monaco"/>
+                <a:cs typeface="Arial" pitchFamily="34" charset="0"/>
+              </a:rPr>
+            </a:br>
+            <a:r>
+              <a:rPr kumimoji="0" lang="en-US" altLang="en-US" sz="1200" b="0" i="0" u="none" strike="noStrike" cap="none" normalizeH="0" baseline="0" dirty="0" smtClean="0">
+                <a:ln>
+                  <a:noFill/>
+                </a:ln>
+                <a:solidFill>
+                  <a:schemeClr val="accent6">
+                    <a:lumMod val="75000"/>
+                  </a:schemeClr>
+                </a:solidFill>
+                <a:effectLst/>
+                <a:latin typeface="Arial Unicode MS"/>
+                <a:ea typeface="Monaco"/>
+                <a:cs typeface="Arial" pitchFamily="34" charset="0"/>
+              </a:rPr>
+              <a:t>*.exe</a:t>
+            </a:r>
+            <a:br>
+              <a:rPr kumimoji="0" lang="en-US" altLang="en-US" sz="1200" b="0" i="0" u="none" strike="noStrike" cap="none" normalizeH="0" baseline="0" dirty="0" smtClean="0">
+                <a:ln>
+                  <a:noFill/>
+                </a:ln>
+                <a:solidFill>
+                  <a:schemeClr val="accent6">
+                    <a:lumMod val="75000"/>
+                  </a:schemeClr>
+                </a:solidFill>
+                <a:effectLst/>
+                <a:latin typeface="Arial Unicode MS"/>
+                <a:ea typeface="Monaco"/>
+                <a:cs typeface="Arial" pitchFamily="34" charset="0"/>
+              </a:rPr>
+            </a:br>
+            <a:r>
+              <a:rPr kumimoji="0" lang="en-US" altLang="en-US" sz="1200" b="0" i="0" u="none" strike="noStrike" cap="none" normalizeH="0" baseline="0" dirty="0" smtClean="0">
+                <a:ln>
+                  <a:noFill/>
+                </a:ln>
+                <a:solidFill>
+                  <a:schemeClr val="accent6">
+                    <a:lumMod val="75000"/>
+                  </a:schemeClr>
+                </a:solidFill>
+                <a:effectLst/>
+                <a:latin typeface="Arial Unicode MS"/>
+                <a:ea typeface="Monaco"/>
+                <a:cs typeface="Arial" pitchFamily="34" charset="0"/>
+              </a:rPr>
+              <a:t>*.o</a:t>
+            </a:r>
+            <a:br>
+              <a:rPr kumimoji="0" lang="en-US" altLang="en-US" sz="1200" b="0" i="0" u="none" strike="noStrike" cap="none" normalizeH="0" baseline="0" dirty="0" smtClean="0">
+                <a:ln>
+                  <a:noFill/>
+                </a:ln>
+                <a:solidFill>
+                  <a:schemeClr val="accent6">
+                    <a:lumMod val="75000"/>
+                  </a:schemeClr>
+                </a:solidFill>
+                <a:effectLst/>
+                <a:latin typeface="Arial Unicode MS"/>
+                <a:ea typeface="Monaco"/>
+                <a:cs typeface="Arial" pitchFamily="34" charset="0"/>
+              </a:rPr>
+            </a:br>
+            <a:r>
+              <a:rPr kumimoji="0" lang="en-US" altLang="en-US" sz="1200" b="0" i="0" u="none" strike="noStrike" cap="none" normalizeH="0" baseline="0" dirty="0" smtClean="0">
+                <a:ln>
+                  <a:noFill/>
+                </a:ln>
+                <a:solidFill>
+                  <a:schemeClr val="accent6">
+                    <a:lumMod val="75000"/>
+                  </a:schemeClr>
+                </a:solidFill>
+                <a:effectLst/>
+                <a:latin typeface="Arial Unicode MS"/>
+                <a:ea typeface="Monaco"/>
+                <a:cs typeface="Arial" pitchFamily="34" charset="0"/>
+              </a:rPr>
+              <a:t>*.so</a:t>
+            </a:r>
+          </a:p>
+          <a:p>
+            <a:pPr marL="0" marR="0" lvl="0" indent="0" algn="l" defTabSz="914400" rtl="0" eaLnBrk="1" fontAlgn="base" latinLnBrk="0" hangingPunct="1">
+              <a:lnSpc>
+                <a:spcPct val="100000"/>
+              </a:lnSpc>
+              <a:spcBef>
+                <a:spcPct val="0"/>
+              </a:spcBef>
+              <a:spcAft>
+                <a:spcPct val="0"/>
+              </a:spcAft>
+              <a:buClrTx/>
+              <a:buSzTx/>
+              <a:buFontTx/>
+              <a:buNone/>
+              <a:tabLst/>
+            </a:pPr>
+            <a:r>
+              <a:rPr kumimoji="0" lang="en-US" altLang="en-US" sz="1200" b="0" i="0" u="none" strike="noStrike" cap="none" normalizeH="0" baseline="0" dirty="0" smtClean="0">
+                <a:ln>
+                  <a:noFill/>
+                </a:ln>
+                <a:solidFill>
+                  <a:schemeClr val="accent6">
+                    <a:lumMod val="75000"/>
+                  </a:schemeClr>
+                </a:solidFill>
+                <a:effectLst/>
+                <a:latin typeface="Arial Unicode MS"/>
+                <a:ea typeface="Monaco"/>
+                <a:cs typeface="Arial" pitchFamily="34" charset="0"/>
+              </a:rPr>
+              <a:t/>
+            </a:r>
+            <a:br>
+              <a:rPr kumimoji="0" lang="en-US" altLang="en-US" sz="1200" b="0" i="0" u="none" strike="noStrike" cap="none" normalizeH="0" baseline="0" dirty="0" smtClean="0">
+                <a:ln>
+                  <a:noFill/>
+                </a:ln>
+                <a:solidFill>
+                  <a:schemeClr val="accent6">
+                    <a:lumMod val="75000"/>
+                  </a:schemeClr>
+                </a:solidFill>
+                <a:effectLst/>
+                <a:latin typeface="Arial Unicode MS"/>
+                <a:ea typeface="Monaco"/>
+                <a:cs typeface="Arial" pitchFamily="34" charset="0"/>
+              </a:rPr>
+            </a:br>
+            <a:r>
+              <a:rPr kumimoji="0" lang="en-US" altLang="en-US" sz="1200" b="0" i="0" u="none" strike="noStrike" cap="none" normalizeH="0" baseline="0" dirty="0" smtClean="0">
+                <a:ln>
+                  <a:noFill/>
+                </a:ln>
+                <a:solidFill>
+                  <a:schemeClr val="accent6">
+                    <a:lumMod val="75000"/>
+                  </a:schemeClr>
+                </a:solidFill>
+                <a:effectLst/>
+                <a:latin typeface="Arial Unicode MS"/>
+                <a:ea typeface="Monaco"/>
+                <a:cs typeface="Arial" pitchFamily="34" charset="0"/>
+              </a:rPr>
+              <a:t># Packages</a:t>
+            </a:r>
+            <a:r>
+              <a:rPr kumimoji="0" lang="en-US" altLang="en-US" sz="1200" b="0" i="0" u="none" strike="noStrike" cap="none" normalizeH="0" dirty="0" smtClean="0">
+                <a:ln>
+                  <a:noFill/>
+                </a:ln>
+                <a:solidFill>
+                  <a:schemeClr val="accent6">
+                    <a:lumMod val="75000"/>
+                  </a:schemeClr>
+                </a:solidFill>
+                <a:effectLst/>
+                <a:latin typeface="Arial Unicode MS"/>
+                <a:ea typeface="Monaco"/>
+                <a:cs typeface="Arial" pitchFamily="34" charset="0"/>
+              </a:rPr>
+              <a:t> </a:t>
+            </a:r>
+            <a:r>
+              <a:rPr kumimoji="0" lang="en-US" altLang="en-US" sz="1200" b="0" i="0" u="none" strike="noStrike" cap="none" normalizeH="0" baseline="0" dirty="0" smtClean="0">
+                <a:ln>
+                  <a:noFill/>
+                </a:ln>
+                <a:solidFill>
+                  <a:schemeClr val="accent6">
+                    <a:lumMod val="75000"/>
+                  </a:schemeClr>
+                </a:solidFill>
+                <a:effectLst/>
+                <a:latin typeface="Arial Unicode MS"/>
+                <a:ea typeface="Monaco"/>
+                <a:cs typeface="Arial" pitchFamily="34" charset="0"/>
+              </a:rPr>
+              <a:t>#</a:t>
+            </a:r>
+          </a:p>
+          <a:p>
+            <a:pPr marL="0" marR="0" lvl="0" indent="0" algn="l" defTabSz="914400" rtl="0" eaLnBrk="1" fontAlgn="base" latinLnBrk="0" hangingPunct="1">
+              <a:lnSpc>
+                <a:spcPct val="100000"/>
+              </a:lnSpc>
+              <a:spcBef>
+                <a:spcPct val="0"/>
+              </a:spcBef>
+              <a:spcAft>
+                <a:spcPct val="0"/>
+              </a:spcAft>
+              <a:buClrTx/>
+              <a:buSzTx/>
+              <a:buFontTx/>
+              <a:buNone/>
+              <a:tabLst/>
+            </a:pPr>
+            <a:r>
+              <a:rPr kumimoji="0" lang="en-US" altLang="en-US" sz="1200" b="0" i="0" u="none" strike="noStrike" cap="none" normalizeH="0" baseline="0" dirty="0" smtClean="0">
+                <a:ln>
+                  <a:noFill/>
+                </a:ln>
+                <a:solidFill>
+                  <a:schemeClr val="accent6">
+                    <a:lumMod val="75000"/>
+                  </a:schemeClr>
+                </a:solidFill>
+                <a:effectLst/>
+                <a:latin typeface="Arial Unicode MS"/>
+                <a:ea typeface="Monaco"/>
+                <a:cs typeface="Arial" pitchFamily="34" charset="0"/>
+              </a:rPr>
+              <a:t>############</a:t>
+            </a:r>
+          </a:p>
+          <a:p>
+            <a:pPr marL="0" marR="0" lvl="0" indent="0" algn="l" defTabSz="914400" rtl="0" eaLnBrk="1" fontAlgn="base" latinLnBrk="0" hangingPunct="1">
+              <a:lnSpc>
+                <a:spcPct val="100000"/>
+              </a:lnSpc>
+              <a:spcBef>
+                <a:spcPct val="0"/>
+              </a:spcBef>
+              <a:spcAft>
+                <a:spcPct val="0"/>
+              </a:spcAft>
+              <a:buClrTx/>
+              <a:buSzTx/>
+              <a:buFontTx/>
+              <a:buNone/>
+              <a:tabLst/>
+            </a:pPr>
+            <a:r>
+              <a:rPr kumimoji="0" lang="en-US" altLang="en-US" sz="1200" b="0" i="0" u="none" strike="noStrike" cap="none" normalizeH="0" baseline="0" dirty="0" smtClean="0">
+                <a:ln>
+                  <a:noFill/>
+                </a:ln>
+                <a:solidFill>
+                  <a:schemeClr val="accent6">
+                    <a:lumMod val="75000"/>
+                  </a:schemeClr>
+                </a:solidFill>
+                <a:effectLst/>
+                <a:latin typeface="Arial Unicode MS"/>
+                <a:ea typeface="Monaco"/>
+                <a:cs typeface="Arial" pitchFamily="34" charset="0"/>
+              </a:rPr>
+              <a:t>*.7z</a:t>
+            </a:r>
+          </a:p>
+          <a:p>
+            <a:pPr marL="0" marR="0" lvl="0" indent="0" algn="l" defTabSz="914400" rtl="0" eaLnBrk="1" fontAlgn="base" latinLnBrk="0" hangingPunct="1">
+              <a:lnSpc>
+                <a:spcPct val="100000"/>
+              </a:lnSpc>
+              <a:spcBef>
+                <a:spcPct val="0"/>
+              </a:spcBef>
+              <a:spcAft>
+                <a:spcPct val="0"/>
+              </a:spcAft>
+              <a:buClrTx/>
+              <a:buSzTx/>
+              <a:buFontTx/>
+              <a:buNone/>
+              <a:tabLst/>
+            </a:pPr>
+            <a:r>
+              <a:rPr kumimoji="0" lang="en-US" altLang="en-US" sz="1200" b="0" i="0" u="none" strike="noStrike" cap="none" normalizeH="0" baseline="0" dirty="0" smtClean="0">
+                <a:ln>
+                  <a:noFill/>
+                </a:ln>
+                <a:solidFill>
+                  <a:schemeClr val="accent6">
+                    <a:lumMod val="75000"/>
+                  </a:schemeClr>
+                </a:solidFill>
+                <a:effectLst/>
+                <a:latin typeface="Arial Unicode MS"/>
+                <a:ea typeface="Monaco"/>
+                <a:cs typeface="Arial" pitchFamily="34" charset="0"/>
+              </a:rPr>
+              <a:t>*.</a:t>
+            </a:r>
+            <a:r>
+              <a:rPr kumimoji="0" lang="en-US" altLang="en-US" sz="1200" b="0" i="0" u="none" strike="noStrike" cap="none" normalizeH="0" baseline="0" dirty="0" err="1" smtClean="0">
+                <a:ln>
+                  <a:noFill/>
+                </a:ln>
+                <a:solidFill>
+                  <a:schemeClr val="accent6">
+                    <a:lumMod val="75000"/>
+                  </a:schemeClr>
+                </a:solidFill>
+                <a:effectLst/>
+                <a:latin typeface="Arial Unicode MS"/>
+                <a:ea typeface="Monaco"/>
+                <a:cs typeface="Arial" pitchFamily="34" charset="0"/>
+              </a:rPr>
+              <a:t>dmg</a:t>
+            </a:r>
+            <a:endParaRPr lang="en-US" altLang="en-US" sz="1200" dirty="0">
+              <a:solidFill>
+                <a:schemeClr val="accent6">
+                  <a:lumMod val="75000"/>
+                </a:schemeClr>
+              </a:solidFill>
+              <a:latin typeface="Arial Unicode MS"/>
+              <a:ea typeface="Monaco"/>
+              <a:cs typeface="Arial" pitchFamily="34" charset="0"/>
+            </a:endParaRPr>
+          </a:p>
+          <a:p>
+            <a:pPr marL="0" marR="0" lvl="0" indent="0" algn="l" defTabSz="914400" rtl="0" eaLnBrk="1" fontAlgn="base" latinLnBrk="0" hangingPunct="1">
+              <a:lnSpc>
+                <a:spcPct val="100000"/>
+              </a:lnSpc>
+              <a:spcBef>
+                <a:spcPct val="0"/>
+              </a:spcBef>
+              <a:spcAft>
+                <a:spcPct val="0"/>
+              </a:spcAft>
+              <a:buClrTx/>
+              <a:buSzTx/>
+              <a:buFontTx/>
+              <a:buNone/>
+              <a:tabLst/>
+            </a:pPr>
+            <a:r>
+              <a:rPr kumimoji="0" lang="en-US" altLang="en-US" sz="1200" b="0" i="0" u="none" strike="noStrike" cap="none" normalizeH="0" baseline="0" dirty="0" smtClean="0">
+                <a:ln>
+                  <a:noFill/>
+                </a:ln>
+                <a:solidFill>
+                  <a:schemeClr val="accent6">
+                    <a:lumMod val="75000"/>
+                  </a:schemeClr>
+                </a:solidFill>
+                <a:effectLst/>
+                <a:latin typeface="Arial Unicode MS"/>
+                <a:ea typeface="Monaco"/>
+                <a:cs typeface="Arial" pitchFamily="34" charset="0"/>
+              </a:rPr>
+              <a:t>*.</a:t>
+            </a:r>
+            <a:r>
+              <a:rPr kumimoji="0" lang="en-US" altLang="en-US" sz="1200" b="0" i="0" u="none" strike="noStrike" cap="none" normalizeH="0" baseline="0" dirty="0" err="1" smtClean="0">
+                <a:ln>
+                  <a:noFill/>
+                </a:ln>
+                <a:solidFill>
+                  <a:schemeClr val="accent6">
+                    <a:lumMod val="75000"/>
+                  </a:schemeClr>
+                </a:solidFill>
+                <a:effectLst/>
+                <a:latin typeface="Arial Unicode MS"/>
+                <a:ea typeface="Monaco"/>
+                <a:cs typeface="Arial" pitchFamily="34" charset="0"/>
+              </a:rPr>
+              <a:t>gz</a:t>
+            </a:r>
+            <a:endParaRPr lang="en-US" altLang="en-US" sz="1200" dirty="0">
+              <a:solidFill>
+                <a:schemeClr val="accent6">
+                  <a:lumMod val="75000"/>
+                </a:schemeClr>
+              </a:solidFill>
+              <a:latin typeface="Arial Unicode MS"/>
+              <a:ea typeface="Monaco"/>
+              <a:cs typeface="Arial" pitchFamily="34" charset="0"/>
+            </a:endParaRPr>
+          </a:p>
+          <a:p>
+            <a:pPr marL="0" marR="0" lvl="0" indent="0" algn="l" defTabSz="914400" rtl="0" eaLnBrk="1" fontAlgn="base" latinLnBrk="0" hangingPunct="1">
+              <a:lnSpc>
+                <a:spcPct val="100000"/>
+              </a:lnSpc>
+              <a:spcBef>
+                <a:spcPct val="0"/>
+              </a:spcBef>
+              <a:spcAft>
+                <a:spcPct val="0"/>
+              </a:spcAft>
+              <a:buClrTx/>
+              <a:buSzTx/>
+              <a:buFontTx/>
+              <a:buNone/>
+              <a:tabLst/>
+            </a:pPr>
+            <a:r>
+              <a:rPr kumimoji="0" lang="en-US" altLang="en-US" sz="1200" b="0" i="0" u="none" strike="noStrike" cap="none" normalizeH="0" baseline="0" dirty="0" smtClean="0">
+                <a:ln>
+                  <a:noFill/>
+                </a:ln>
+                <a:solidFill>
+                  <a:schemeClr val="accent6">
+                    <a:lumMod val="75000"/>
+                  </a:schemeClr>
+                </a:solidFill>
+                <a:effectLst/>
+                <a:latin typeface="Arial Unicode MS"/>
+                <a:ea typeface="Monaco"/>
+                <a:cs typeface="Arial" pitchFamily="34" charset="0"/>
+              </a:rPr>
+              <a:t>*.</a:t>
+            </a:r>
+            <a:r>
+              <a:rPr kumimoji="0" lang="en-US" altLang="en-US" sz="1200" b="0" i="0" u="none" strike="noStrike" cap="none" normalizeH="0" baseline="0" dirty="0" err="1" smtClean="0">
+                <a:ln>
+                  <a:noFill/>
+                </a:ln>
+                <a:solidFill>
+                  <a:schemeClr val="accent6">
+                    <a:lumMod val="75000"/>
+                  </a:schemeClr>
+                </a:solidFill>
+                <a:effectLst/>
+                <a:latin typeface="Arial Unicode MS"/>
+                <a:ea typeface="Monaco"/>
+                <a:cs typeface="Arial" pitchFamily="34" charset="0"/>
+              </a:rPr>
+              <a:t>iso</a:t>
+            </a:r>
+            <a:endParaRPr lang="en-US" altLang="en-US" sz="1200" dirty="0">
+              <a:solidFill>
+                <a:schemeClr val="accent6">
+                  <a:lumMod val="75000"/>
+                </a:schemeClr>
+              </a:solidFill>
+              <a:latin typeface="Arial Unicode MS"/>
+              <a:ea typeface="Monaco"/>
+              <a:cs typeface="Arial" pitchFamily="34" charset="0"/>
+            </a:endParaRPr>
+          </a:p>
+          <a:p>
+            <a:pPr marL="0" marR="0" lvl="0" indent="0" algn="l" defTabSz="914400" rtl="0" eaLnBrk="1" fontAlgn="base" latinLnBrk="0" hangingPunct="1">
+              <a:lnSpc>
+                <a:spcPct val="100000"/>
+              </a:lnSpc>
+              <a:spcBef>
+                <a:spcPct val="0"/>
+              </a:spcBef>
+              <a:spcAft>
+                <a:spcPct val="0"/>
+              </a:spcAft>
+              <a:buClrTx/>
+              <a:buSzTx/>
+              <a:buFontTx/>
+              <a:buNone/>
+              <a:tabLst/>
+            </a:pPr>
+            <a:r>
+              <a:rPr kumimoji="0" lang="en-US" altLang="en-US" sz="1200" b="0" i="0" u="none" strike="noStrike" cap="none" normalizeH="0" baseline="0" dirty="0" smtClean="0">
+                <a:ln>
+                  <a:noFill/>
+                </a:ln>
+                <a:solidFill>
+                  <a:schemeClr val="accent6">
+                    <a:lumMod val="75000"/>
+                  </a:schemeClr>
+                </a:solidFill>
+                <a:effectLst/>
+                <a:latin typeface="Arial Unicode MS"/>
+                <a:ea typeface="Monaco"/>
+                <a:cs typeface="Arial" pitchFamily="34" charset="0"/>
+              </a:rPr>
+              <a:t>*.jar</a:t>
+            </a:r>
+          </a:p>
+          <a:p>
+            <a:pPr lvl="0" fontAlgn="base">
+              <a:spcBef>
+                <a:spcPct val="0"/>
+              </a:spcBef>
+              <a:spcAft>
+                <a:spcPct val="0"/>
+              </a:spcAft>
+            </a:pPr>
+            <a:r>
+              <a:rPr lang="en-US" altLang="en-US" sz="1200" dirty="0">
+                <a:solidFill>
+                  <a:schemeClr val="accent6">
+                    <a:lumMod val="75000"/>
+                  </a:schemeClr>
+                </a:solidFill>
+                <a:latin typeface="Arial Unicode MS"/>
+                <a:ea typeface="Monaco"/>
+                <a:cs typeface="Arial" pitchFamily="34" charset="0"/>
+              </a:rPr>
+              <a:t>*.</a:t>
+            </a:r>
+            <a:r>
+              <a:rPr lang="en-US" altLang="en-US" sz="1200" dirty="0" err="1" smtClean="0">
+                <a:solidFill>
+                  <a:schemeClr val="accent6">
+                    <a:lumMod val="75000"/>
+                  </a:schemeClr>
+                </a:solidFill>
+                <a:latin typeface="Arial Unicode MS"/>
+                <a:ea typeface="Monaco"/>
+                <a:cs typeface="Arial" pitchFamily="34" charset="0"/>
+              </a:rPr>
+              <a:t>rar</a:t>
+            </a:r>
+            <a:endParaRPr lang="en-US" altLang="en-US" sz="1200" dirty="0">
+              <a:solidFill>
+                <a:schemeClr val="accent6">
+                  <a:lumMod val="75000"/>
+                </a:schemeClr>
+              </a:solidFill>
+              <a:latin typeface="Arial Unicode MS"/>
+              <a:ea typeface="Monaco"/>
+              <a:cs typeface="Arial" pitchFamily="34" charset="0"/>
+            </a:endParaRPr>
+          </a:p>
+        </p:txBody>
+      </p:sp>
+      <p:sp>
+        <p:nvSpPr>
+          <p:cNvPr id="6" name="Rectangle 5"/>
+          <p:cNvSpPr/>
+          <p:nvPr/>
+        </p:nvSpPr>
+        <p:spPr>
+          <a:xfrm>
+            <a:off x="6516216" y="2852936"/>
+            <a:ext cx="1872208" cy="3270726"/>
+          </a:xfrm>
+          <a:prstGeom prst="rect">
+            <a:avLst/>
+          </a:prstGeom>
+          <a:solidFill>
+            <a:schemeClr val="tx1"/>
+          </a:solidFill>
+          <a:ln>
+            <a:noFill/>
+          </a:ln>
+          <a:effectLst/>
+        </p:spPr>
+        <p:txBody>
+          <a:bodyPr vert="horz" wrap="square" lIns="0" tIns="65067" rIns="0" bIns="65067" numCol="1" anchor="ctr" anchorCtr="0" compatLnSpc="1">
+            <a:prstTxWarp prst="textNoShape">
+              <a:avLst/>
+            </a:prstTxWarp>
+            <a:spAutoFit/>
+          </a:bodyPr>
+          <a:lstStyle/>
+          <a:p>
+            <a:pPr fontAlgn="base">
+              <a:spcBef>
+                <a:spcPct val="0"/>
+              </a:spcBef>
+              <a:spcAft>
+                <a:spcPct val="0"/>
+              </a:spcAft>
+            </a:pPr>
+            <a:r>
+              <a:rPr lang="en-US" altLang="en-US" sz="1200" dirty="0">
+                <a:solidFill>
+                  <a:schemeClr val="accent6">
+                    <a:lumMod val="75000"/>
+                  </a:schemeClr>
+                </a:solidFill>
+                <a:latin typeface="Arial Unicode MS"/>
+                <a:ea typeface="Monaco"/>
+                <a:cs typeface="Arial" pitchFamily="34" charset="0"/>
+              </a:rPr>
+              <a:t>*.tar</a:t>
+            </a:r>
+          </a:p>
+          <a:p>
+            <a:pPr lvl="0" fontAlgn="base">
+              <a:spcBef>
+                <a:spcPct val="0"/>
+              </a:spcBef>
+              <a:spcAft>
+                <a:spcPct val="0"/>
+              </a:spcAft>
+            </a:pPr>
+            <a:r>
+              <a:rPr lang="en-US" altLang="en-US" sz="1200" dirty="0" smtClean="0">
+                <a:solidFill>
+                  <a:schemeClr val="accent6">
+                    <a:lumMod val="75000"/>
+                  </a:schemeClr>
+                </a:solidFill>
+                <a:latin typeface="Arial Unicode MS"/>
+                <a:ea typeface="Monaco"/>
+                <a:cs typeface="Arial" pitchFamily="34" charset="0"/>
+              </a:rPr>
+              <a:t>*.zip</a:t>
+            </a:r>
+          </a:p>
+          <a:p>
+            <a:pPr lvl="0" fontAlgn="base">
+              <a:spcBef>
+                <a:spcPct val="0"/>
+              </a:spcBef>
+              <a:spcAft>
+                <a:spcPct val="0"/>
+              </a:spcAft>
+            </a:pPr>
+            <a:endParaRPr lang="en-US" altLang="en-US" sz="1200" dirty="0">
+              <a:solidFill>
+                <a:schemeClr val="accent6">
+                  <a:lumMod val="75000"/>
+                </a:schemeClr>
+              </a:solidFill>
+              <a:latin typeface="Arial Unicode MS"/>
+              <a:ea typeface="Monaco"/>
+              <a:cs typeface="Arial" pitchFamily="34" charset="0"/>
+            </a:endParaRPr>
+          </a:p>
+          <a:p>
+            <a:pPr fontAlgn="base">
+              <a:spcBef>
+                <a:spcPct val="0"/>
+              </a:spcBef>
+              <a:spcAft>
+                <a:spcPct val="0"/>
+              </a:spcAft>
+            </a:pPr>
+            <a:r>
+              <a:rPr lang="en-US" altLang="en-US" sz="1200" dirty="0" smtClean="0">
+                <a:solidFill>
+                  <a:schemeClr val="accent6">
+                    <a:lumMod val="75000"/>
+                  </a:schemeClr>
+                </a:solidFill>
+                <a:latin typeface="Arial Unicode MS"/>
+                <a:ea typeface="Monaco"/>
+                <a:cs typeface="Arial" pitchFamily="34" charset="0"/>
+              </a:rPr>
+              <a:t># </a:t>
+            </a:r>
+            <a:r>
+              <a:rPr lang="en-US" altLang="en-US" sz="1200" dirty="0">
+                <a:solidFill>
+                  <a:schemeClr val="accent6">
+                    <a:lumMod val="75000"/>
+                  </a:schemeClr>
+                </a:solidFill>
+                <a:latin typeface="Arial Unicode MS"/>
+                <a:ea typeface="Monaco"/>
+                <a:cs typeface="Arial" pitchFamily="34" charset="0"/>
+              </a:rPr>
+              <a:t>Logs and databases #</a:t>
+            </a:r>
+          </a:p>
+          <a:p>
+            <a:pPr fontAlgn="base">
+              <a:spcBef>
+                <a:spcPct val="0"/>
+              </a:spcBef>
+              <a:spcAft>
+                <a:spcPct val="0"/>
+              </a:spcAft>
+            </a:pPr>
+            <a:r>
+              <a:rPr lang="en-US" altLang="en-US" sz="1200" dirty="0">
+                <a:solidFill>
+                  <a:schemeClr val="accent6">
+                    <a:lumMod val="75000"/>
+                  </a:schemeClr>
+                </a:solidFill>
+                <a:latin typeface="Arial Unicode MS"/>
+                <a:ea typeface="Monaco"/>
+                <a:cs typeface="Arial" pitchFamily="34" charset="0"/>
+              </a:rPr>
+              <a:t>######################</a:t>
+            </a:r>
+          </a:p>
+          <a:p>
+            <a:pPr fontAlgn="base">
+              <a:spcBef>
+                <a:spcPct val="0"/>
+              </a:spcBef>
+              <a:spcAft>
+                <a:spcPct val="0"/>
+              </a:spcAft>
+            </a:pPr>
+            <a:r>
+              <a:rPr lang="en-US" altLang="en-US" sz="1200" dirty="0">
+                <a:solidFill>
+                  <a:schemeClr val="accent6">
+                    <a:lumMod val="75000"/>
+                  </a:schemeClr>
+                </a:solidFill>
+                <a:latin typeface="Arial Unicode MS"/>
+                <a:ea typeface="Monaco"/>
+                <a:cs typeface="Arial" pitchFamily="34" charset="0"/>
+              </a:rPr>
+              <a:t>*.log</a:t>
+            </a:r>
+          </a:p>
+          <a:p>
+            <a:pPr fontAlgn="base">
+              <a:spcBef>
+                <a:spcPct val="0"/>
+              </a:spcBef>
+              <a:spcAft>
+                <a:spcPct val="0"/>
+              </a:spcAft>
+            </a:pPr>
+            <a:r>
+              <a:rPr lang="en-US" altLang="en-US" sz="1200" dirty="0">
+                <a:solidFill>
+                  <a:schemeClr val="accent6">
+                    <a:lumMod val="75000"/>
+                  </a:schemeClr>
+                </a:solidFill>
+                <a:latin typeface="Arial Unicode MS"/>
+                <a:ea typeface="Monaco"/>
+                <a:cs typeface="Arial" pitchFamily="34" charset="0"/>
+              </a:rPr>
+              <a:t>*.</a:t>
+            </a:r>
+            <a:r>
+              <a:rPr lang="en-US" altLang="en-US" sz="1200" dirty="0" err="1">
+                <a:solidFill>
+                  <a:schemeClr val="accent6">
+                    <a:lumMod val="75000"/>
+                  </a:schemeClr>
+                </a:solidFill>
+                <a:latin typeface="Arial Unicode MS"/>
+                <a:ea typeface="Monaco"/>
+                <a:cs typeface="Arial" pitchFamily="34" charset="0"/>
+              </a:rPr>
+              <a:t>sql</a:t>
+            </a:r>
+            <a:endParaRPr lang="en-US" altLang="en-US" sz="1200" dirty="0">
+              <a:solidFill>
+                <a:schemeClr val="accent6">
+                  <a:lumMod val="75000"/>
+                </a:schemeClr>
+              </a:solidFill>
+              <a:latin typeface="Arial Unicode MS"/>
+              <a:ea typeface="Monaco"/>
+              <a:cs typeface="Arial" pitchFamily="34" charset="0"/>
+            </a:endParaRPr>
+          </a:p>
+          <a:p>
+            <a:pPr fontAlgn="base">
+              <a:spcBef>
+                <a:spcPct val="0"/>
+              </a:spcBef>
+              <a:spcAft>
+                <a:spcPct val="0"/>
+              </a:spcAft>
+            </a:pPr>
+            <a:r>
+              <a:rPr lang="en-US" altLang="en-US" sz="1200" dirty="0">
+                <a:solidFill>
+                  <a:schemeClr val="accent6">
+                    <a:lumMod val="75000"/>
+                  </a:schemeClr>
+                </a:solidFill>
+                <a:latin typeface="Arial Unicode MS"/>
+                <a:ea typeface="Monaco"/>
+                <a:cs typeface="Arial" pitchFamily="34" charset="0"/>
+              </a:rPr>
+              <a:t>*.</a:t>
+            </a:r>
+            <a:r>
+              <a:rPr lang="en-US" altLang="en-US" sz="1200" dirty="0" err="1" smtClean="0">
+                <a:solidFill>
+                  <a:schemeClr val="accent6">
+                    <a:lumMod val="75000"/>
+                  </a:schemeClr>
+                </a:solidFill>
+                <a:latin typeface="Arial Unicode MS"/>
+                <a:ea typeface="Monaco"/>
+                <a:cs typeface="Arial" pitchFamily="34" charset="0"/>
+              </a:rPr>
+              <a:t>sqlite</a:t>
+            </a:r>
+            <a:endParaRPr lang="en-US" altLang="en-US" sz="1200" dirty="0" smtClean="0">
+              <a:solidFill>
+                <a:schemeClr val="accent6">
+                  <a:lumMod val="75000"/>
+                </a:schemeClr>
+              </a:solidFill>
+              <a:latin typeface="Arial Unicode MS"/>
+              <a:ea typeface="Monaco"/>
+              <a:cs typeface="Arial" pitchFamily="34" charset="0"/>
+            </a:endParaRPr>
+          </a:p>
+          <a:p>
+            <a:pPr fontAlgn="base">
+              <a:spcBef>
+                <a:spcPct val="0"/>
+              </a:spcBef>
+              <a:spcAft>
+                <a:spcPct val="0"/>
+              </a:spcAft>
+            </a:pPr>
+            <a:endParaRPr lang="en-US" altLang="en-US" sz="1200" dirty="0">
+              <a:solidFill>
+                <a:schemeClr val="accent6">
+                  <a:lumMod val="75000"/>
+                </a:schemeClr>
+              </a:solidFill>
+              <a:latin typeface="Arial Unicode MS"/>
+              <a:ea typeface="Monaco"/>
+              <a:cs typeface="Arial" pitchFamily="34" charset="0"/>
+            </a:endParaRPr>
+          </a:p>
+          <a:p>
+            <a:pPr fontAlgn="base">
+              <a:spcBef>
+                <a:spcPct val="0"/>
+              </a:spcBef>
+              <a:spcAft>
+                <a:spcPct val="0"/>
+              </a:spcAft>
+            </a:pPr>
+            <a:r>
+              <a:rPr lang="en-US" altLang="en-US" sz="1200" dirty="0">
+                <a:solidFill>
+                  <a:schemeClr val="accent6">
+                    <a:lumMod val="75000"/>
+                  </a:schemeClr>
+                </a:solidFill>
+                <a:latin typeface="Arial Unicode MS"/>
+                <a:ea typeface="Monaco"/>
+                <a:cs typeface="Arial" pitchFamily="34" charset="0"/>
+              </a:rPr>
+              <a:t># OS generated files #</a:t>
+            </a:r>
+          </a:p>
+          <a:p>
+            <a:pPr fontAlgn="base">
+              <a:spcBef>
+                <a:spcPct val="0"/>
+              </a:spcBef>
+              <a:spcAft>
+                <a:spcPct val="0"/>
+              </a:spcAft>
+            </a:pPr>
+            <a:r>
+              <a:rPr lang="en-US" altLang="en-US" sz="1200" dirty="0">
+                <a:solidFill>
+                  <a:schemeClr val="accent6">
+                    <a:lumMod val="75000"/>
+                  </a:schemeClr>
+                </a:solidFill>
+                <a:latin typeface="Arial Unicode MS"/>
+                <a:ea typeface="Monaco"/>
+                <a:cs typeface="Arial" pitchFamily="34" charset="0"/>
+              </a:rPr>
+              <a:t>######################</a:t>
+            </a:r>
+          </a:p>
+          <a:p>
+            <a:pPr fontAlgn="base">
+              <a:spcBef>
+                <a:spcPct val="0"/>
+              </a:spcBef>
+              <a:spcAft>
+                <a:spcPct val="0"/>
+              </a:spcAft>
+            </a:pPr>
+            <a:r>
+              <a:rPr lang="en-US" altLang="en-US" sz="1200" dirty="0">
+                <a:solidFill>
+                  <a:schemeClr val="accent6">
+                    <a:lumMod val="75000"/>
+                  </a:schemeClr>
+                </a:solidFill>
+                <a:latin typeface="Arial Unicode MS"/>
+                <a:ea typeface="Monaco"/>
+                <a:cs typeface="Arial" pitchFamily="34" charset="0"/>
+              </a:rPr>
+              <a:t>.</a:t>
+            </a:r>
+            <a:r>
+              <a:rPr lang="en-US" altLang="en-US" sz="1200" dirty="0" err="1">
+                <a:solidFill>
+                  <a:schemeClr val="accent6">
+                    <a:lumMod val="75000"/>
+                  </a:schemeClr>
+                </a:solidFill>
+                <a:latin typeface="Arial Unicode MS"/>
+                <a:ea typeface="Monaco"/>
+                <a:cs typeface="Arial" pitchFamily="34" charset="0"/>
+              </a:rPr>
+              <a:t>DS_Store</a:t>
+            </a:r>
+            <a:endParaRPr lang="en-US" altLang="en-US" sz="1200" dirty="0">
+              <a:solidFill>
+                <a:schemeClr val="accent6">
+                  <a:lumMod val="75000"/>
+                </a:schemeClr>
+              </a:solidFill>
+              <a:latin typeface="Arial Unicode MS"/>
+              <a:ea typeface="Monaco"/>
+              <a:cs typeface="Arial" pitchFamily="34" charset="0"/>
+            </a:endParaRPr>
+          </a:p>
+          <a:p>
+            <a:pPr fontAlgn="base">
+              <a:spcBef>
+                <a:spcPct val="0"/>
+              </a:spcBef>
+              <a:spcAft>
+                <a:spcPct val="0"/>
+              </a:spcAft>
+            </a:pPr>
+            <a:r>
+              <a:rPr lang="en-US" altLang="en-US" sz="1200" dirty="0">
+                <a:solidFill>
+                  <a:schemeClr val="accent6">
+                    <a:lumMod val="75000"/>
+                  </a:schemeClr>
+                </a:solidFill>
+                <a:latin typeface="Arial Unicode MS"/>
+                <a:ea typeface="Monaco"/>
+                <a:cs typeface="Arial" pitchFamily="34" charset="0"/>
+              </a:rPr>
+              <a:t>.</a:t>
+            </a:r>
+            <a:r>
+              <a:rPr lang="en-US" altLang="en-US" sz="1200" dirty="0" err="1">
+                <a:solidFill>
+                  <a:schemeClr val="accent6">
+                    <a:lumMod val="75000"/>
+                  </a:schemeClr>
+                </a:solidFill>
+                <a:latin typeface="Arial Unicode MS"/>
+                <a:ea typeface="Monaco"/>
+                <a:cs typeface="Arial" pitchFamily="34" charset="0"/>
+              </a:rPr>
+              <a:t>DS_Store</a:t>
+            </a:r>
+            <a:r>
+              <a:rPr lang="en-US" altLang="en-US" sz="1200" dirty="0">
+                <a:solidFill>
+                  <a:schemeClr val="accent6">
+                    <a:lumMod val="75000"/>
+                  </a:schemeClr>
+                </a:solidFill>
+                <a:latin typeface="Arial Unicode MS"/>
+                <a:ea typeface="Monaco"/>
+                <a:cs typeface="Arial" pitchFamily="34" charset="0"/>
+              </a:rPr>
+              <a:t>?</a:t>
+            </a:r>
+          </a:p>
+          <a:p>
+            <a:pPr fontAlgn="base">
+              <a:spcBef>
+                <a:spcPct val="0"/>
+              </a:spcBef>
+              <a:spcAft>
+                <a:spcPct val="0"/>
+              </a:spcAft>
+            </a:pPr>
+            <a:r>
+              <a:rPr lang="en-US" altLang="en-US" sz="1200" dirty="0">
+                <a:solidFill>
+                  <a:schemeClr val="accent6">
+                    <a:lumMod val="75000"/>
+                  </a:schemeClr>
+                </a:solidFill>
+                <a:latin typeface="Arial Unicode MS"/>
+                <a:ea typeface="Monaco"/>
+                <a:cs typeface="Arial" pitchFamily="34" charset="0"/>
+              </a:rPr>
+              <a:t>._*</a:t>
+            </a:r>
+          </a:p>
+          <a:p>
+            <a:pPr fontAlgn="base">
+              <a:spcBef>
+                <a:spcPct val="0"/>
+              </a:spcBef>
+              <a:spcAft>
+                <a:spcPct val="0"/>
+              </a:spcAft>
+            </a:pPr>
+            <a:r>
+              <a:rPr lang="en-US" altLang="en-US" sz="1200" dirty="0">
+                <a:solidFill>
+                  <a:schemeClr val="accent6">
+                    <a:lumMod val="75000"/>
+                  </a:schemeClr>
+                </a:solidFill>
+                <a:latin typeface="Arial Unicode MS"/>
+                <a:ea typeface="Monaco"/>
+                <a:cs typeface="Arial" pitchFamily="34" charset="0"/>
+              </a:rPr>
+              <a:t>.Spotlight-V100</a:t>
+            </a:r>
+          </a:p>
+          <a:p>
+            <a:pPr fontAlgn="base">
+              <a:spcBef>
+                <a:spcPct val="0"/>
+              </a:spcBef>
+              <a:spcAft>
+                <a:spcPct val="0"/>
+              </a:spcAft>
+            </a:pPr>
+            <a:r>
+              <a:rPr lang="en-US" altLang="en-US" sz="1200" dirty="0">
+                <a:solidFill>
+                  <a:schemeClr val="accent6">
+                    <a:lumMod val="75000"/>
+                  </a:schemeClr>
+                </a:solidFill>
+                <a:latin typeface="Arial Unicode MS"/>
+                <a:ea typeface="Monaco"/>
+                <a:cs typeface="Arial" pitchFamily="34" charset="0"/>
+              </a:rPr>
+              <a:t>.</a:t>
+            </a:r>
+            <a:r>
+              <a:rPr lang="en-US" altLang="en-US" sz="1200" dirty="0" smtClean="0">
+                <a:solidFill>
+                  <a:schemeClr val="accent6">
+                    <a:lumMod val="75000"/>
+                  </a:schemeClr>
+                </a:solidFill>
+                <a:latin typeface="Arial Unicode MS"/>
+                <a:ea typeface="Monaco"/>
+                <a:cs typeface="Arial" pitchFamily="34" charset="0"/>
+              </a:rPr>
+              <a:t>Trashes</a:t>
+            </a:r>
+          </a:p>
+          <a:p>
+            <a:pPr fontAlgn="base">
+              <a:spcBef>
+                <a:spcPct val="0"/>
+              </a:spcBef>
+              <a:spcAft>
+                <a:spcPct val="0"/>
+              </a:spcAft>
+            </a:pPr>
+            <a:r>
+              <a:rPr lang="en-US" altLang="en-US" sz="1200" dirty="0" err="1" smtClean="0">
+                <a:solidFill>
+                  <a:schemeClr val="accent6">
+                    <a:lumMod val="75000"/>
+                  </a:schemeClr>
+                </a:solidFill>
+                <a:latin typeface="Arial Unicode MS"/>
+                <a:ea typeface="Monaco"/>
+                <a:cs typeface="Arial" pitchFamily="34" charset="0"/>
+              </a:rPr>
+              <a:t>Thumbs.db</a:t>
+            </a:r>
+            <a:r>
+              <a:rPr lang="en-US" altLang="en-US" sz="1200" dirty="0" smtClean="0">
+                <a:solidFill>
+                  <a:schemeClr val="accent6">
+                    <a:lumMod val="75000"/>
+                  </a:schemeClr>
+                </a:solidFill>
+                <a:latin typeface="Arial Unicode MS"/>
+                <a:ea typeface="Monaco"/>
+                <a:cs typeface="Arial" pitchFamily="34" charset="0"/>
+              </a:rPr>
+              <a:t> </a:t>
+            </a:r>
+            <a:endParaRPr lang="en-US" altLang="en-US" sz="1200" dirty="0">
+              <a:solidFill>
+                <a:schemeClr val="accent6">
+                  <a:lumMod val="75000"/>
+                </a:schemeClr>
+              </a:solidFill>
+              <a:latin typeface="Arial Unicode MS"/>
+              <a:ea typeface="Monaco"/>
+              <a:cs typeface="Arial" pitchFamily="34" charset="0"/>
+            </a:endParaRPr>
           </a:p>
         </p:txBody>
       </p:sp>
     </p:spTree>
     <p:extLst>
       <p:ext uri="{BB962C8B-B14F-4D97-AF65-F5344CB8AC3E}">
-        <p14:creationId xmlns:p14="http://schemas.microsoft.com/office/powerpoint/2010/main" val="2464727958"/>
+        <p14:creationId xmlns:p14="http://schemas.microsoft.com/office/powerpoint/2010/main" val="2154374957"/>
       </p:ext>
     </p:extLst>
   </p:cSld>

</xml_diff>